<commit_message>
Deploying to gh-pages from @ ManuelePasini/slides-markdown@5178a04e9594884a29f4b2a8011f1a9b14b8355c 🚀
</commit_message>
<xml_diff>
--- a/stgraph.pptx
+++ b/stgraph.pptx
@@ -3241,7 +3241,15 @@
             <a:pPr lvl="1"/>
             <a:r>
               <a:rPr/>
-              <a:t>Usually built on index-free adjacency principles.</a:t>
+              <a:t>Usually built on data structures implementing </a:t>
+            </a:r>
+            <a:r>
+              <a:rPr b="1"/>
+              <a:t>index-free adjacency principles</a:t>
+            </a:r>
+            <a:r>
+              <a:rPr/>
+              <a:t>.</a:t>
             </a:r>
           </a:p>
           <a:p>
@@ -3255,7 +3263,15 @@
             <a:pPr lvl="1"/>
             <a:r>
               <a:rPr/>
-              <a:t>Usually built on Log-Structured Merge Trees.</a:t>
+              <a:t>Usually built on </a:t>
+            </a:r>
+            <a:r>
+              <a:rPr b="1"/>
+              <a:t>Log-Structured Merge Tree</a:t>
+            </a:r>
+            <a:r>
+              <a:rPr/>
+              <a:t> based data structures.</a:t>
             </a:r>
           </a:p>
         </p:txBody>

</xml_diff>

<commit_message>
Deploying to gh-pages from @ ManuelePasini/slides-markdown@635a218c9f338a4f6e1e35d52b76433fd39933b3 🚀
</commit_message>
<xml_diff>
--- a/stgraph.pptx
+++ b/stgraph.pptx
@@ -3241,7 +3241,7 @@
             <a:pPr lvl="1"/>
             <a:r>
               <a:rPr/>
-              <a:t>Usually built on data structures implementing </a:t>
+              <a:t>Natively built on </a:t>
             </a:r>
             <a:r>
               <a:rPr b="1"/>
@@ -3256,14 +3256,14 @@
             <a:pPr lvl="0"/>
             <a:r>
               <a:rPr/>
-              <a:t>Time-Series DBMSs are are designed for high-throughput temporal ingestion and efficient management of time-structured data;</a:t>
+              <a:t>Time-Series DBMSs are designed for high-throughput temporal ingestion and efficient management of time-structured data;</a:t>
             </a:r>
           </a:p>
           <a:p>
             <a:pPr lvl="1"/>
             <a:r>
               <a:rPr/>
-              <a:t>Usually built on </a:t>
+              <a:t>Natively built on </a:t>
             </a:r>
             <a:r>
               <a:rPr b="1"/>

</xml_diff>

<commit_message>
Deploying to gh-pages from @ ManuelePasini/slides-markdown@6fc4e23890390a92411c73119cbe49bdbd95b167 🚀
</commit_message>
<xml_diff>
--- a/stgraph.pptx
+++ b/stgraph.pptx
@@ -3234,7 +3234,7 @@
             <a:pPr lvl="0"/>
             <a:r>
               <a:rPr/>
-              <a:t>Graph DBMSs are optimized for high-performance entity traversal;</a:t>
+              <a:t>Graph DBMSs</a:t>
             </a:r>
           </a:p>
           <a:p>
@@ -3249,14 +3249,28 @@
             </a:r>
             <a:r>
               <a:rPr/>
-              <a:t>.</a:t>
+              <a:t>;</a:t>
+            </a:r>
+          </a:p>
+          <a:p>
+            <a:pPr lvl="1"/>
+            <a:r>
+              <a:rPr/>
+              <a:t>Optimized for high-performance entity traversal;</a:t>
+            </a:r>
+          </a:p>
+          <a:p>
+            <a:pPr lvl="1"/>
+            <a:r>
+              <a:rPr/>
+              <a:t>Efficient on small-volume datasets .</a:t>
             </a:r>
           </a:p>
           <a:p>
             <a:pPr lvl="0"/>
             <a:r>
               <a:rPr/>
-              <a:t>Time-Series DBMSs are designed for high-throughput temporal ingestion and efficient management of time-structured data;</a:t>
+              <a:t>Time-Series DBMSs</a:t>
             </a:r>
           </a:p>
           <a:p>
@@ -3271,7 +3285,21 @@
             </a:r>
             <a:r>
               <a:rPr/>
-              <a:t> based data structures.</a:t>
+              <a:t> based data structures;</a:t>
+            </a:r>
+          </a:p>
+          <a:p>
+            <a:pPr lvl="1"/>
+            <a:r>
+              <a:rPr/>
+              <a:t>Optimized for high-throughput temporal ingestion and efficient management of time-ordered data;</a:t>
+            </a:r>
+          </a:p>
+          <a:p>
+            <a:pPr lvl="1"/>
+            <a:r>
+              <a:rPr/>
+              <a:t>Efficient on large-volume datasets.</a:t>
             </a:r>
           </a:p>
         </p:txBody>

</xml_diff>

<commit_message>
Deploying to gh-pages from @ ManuelePasini/slides-markdown@6f02e880b7231283fb77eb314732c4d40ed3e96c 🚀
</commit_message>
<xml_diff>
--- a/stgraph.pptx
+++ b/stgraph.pptx
@@ -3300,6 +3300,48 @@
             <a:r>
               <a:rPr/>
               <a:t>Efficient on large-volume datasets.</a:t>
+            </a:r>
+          </a:p>
+          <a:p>
+            <a:pPr lvl="0"/>
+            <a:r>
+              <a:rPr/>
+              <a:t>Different data layouts entail different workload and ingestion capabilities…</a:t>
+            </a:r>
+          </a:p>
+          <a:p>
+            <a:pPr lvl="0"/>
+            <a:r>
+              <a:rPr/>
+              <a:t>But nowadays data-intensive applications often entail both characteristics…</a:t>
+            </a:r>
+          </a:p>
+          <a:p>
+            <a:pPr lvl="1"/>
+            <a:r>
+              <a:rPr/>
+              <a:t>… Internet-of-Things networks</a:t>
+            </a:r>
+          </a:p>
+          <a:p>
+            <a:pPr lvl="1"/>
+            <a:r>
+              <a:rPr/>
+              <a:t>… Digital Twins applications</a:t>
+            </a:r>
+          </a:p>
+          <a:p>
+            <a:pPr lvl="1"/>
+            <a:r>
+              <a:rPr/>
+              <a:t>… Pervasive computing</a:t>
+            </a:r>
+          </a:p>
+          <a:p>
+            <a:pPr lvl="0"/>
+            <a:r>
+              <a:rPr b="1"/>
+              <a:t>What about an hybrid data structure ?</a:t>
             </a:r>
           </a:p>
         </p:txBody>

</xml_diff>

<commit_message>
Deploying to gh-pages from @ ManuelePasini/slides-markdown@86710101071de78104baf3ab931ca6c51583c8ae 🚀
</commit_message>
<xml_diff>
--- a/stgraph.pptx
+++ b/stgraph.pptx
@@ -7,6 +7,7 @@
   <p:sldIdLst>
     <p:sldId id="256" r:id="rId2"/>
     <p:sldId id="257" r:id="rId3"/>
+    <p:sldId id="258" r:id="rId4"/>
   </p:sldIdLst>
   <p:sldSz cx="9144000" cy="5143500" type="screen16x9"/>
   <p:notesSz cx="6858000" cy="9144000"/>
@@ -3306,35 +3307,14 @@
             <a:pPr lvl="0"/>
             <a:r>
               <a:rPr/>
-              <a:t>Different data layouts entail different workload and ingestion capabilities…</a:t>
+              <a:t>Different data layouts imply different ingestion and workload capabilities…</a:t>
             </a:r>
           </a:p>
           <a:p>
             <a:pPr lvl="0"/>
             <a:r>
               <a:rPr/>
-              <a:t>But nowadays data-intensive applications often entail both characteristics…</a:t>
-            </a:r>
-          </a:p>
-          <a:p>
-            <a:pPr lvl="1"/>
-            <a:r>
-              <a:rPr/>
-              <a:t>… Internet-of-Things networks</a:t>
-            </a:r>
-          </a:p>
-          <a:p>
-            <a:pPr lvl="1"/>
-            <a:r>
-              <a:rPr/>
-              <a:t>… Digital Twins applications</a:t>
-            </a:r>
-          </a:p>
-          <a:p>
-            <a:pPr lvl="1"/>
-            <a:r>
-              <a:rPr/>
-              <a:t>… Pervasive computing</a:t>
+              <a:t>Yet many modern data-intensive applications combine both, e.g., IoT systems, Digital Twins, and pervasive computing.</a:t>
             </a:r>
           </a:p>
           <a:p>
@@ -3342,6 +3322,143 @@
             <a:r>
               <a:rPr b="1"/>
               <a:t>What about an hybrid data structure ?</a:t>
+            </a:r>
+          </a:p>
+        </p:txBody>
+      </p:sp>
+    </p:spTree>
+  </p:cSld>
+</p:sld>
+</file>
+
+<file path=ppt/slides/slide3.xml><?xml version="1.0" encoding="utf-8"?>
+<p:sld xmlns:a="http://schemas.openxmlformats.org/drawingml/2006/main" xmlns:r="http://schemas.openxmlformats.org/officeDocument/2006/relationships" xmlns:p="http://schemas.openxmlformats.org/presentationml/2006/main">
+  <p:cSld>
+    <p:spTree>
+      <p:nvGrpSpPr>
+        <p:cNvPr id="1" name=""/>
+        <p:cNvGrpSpPr/>
+        <p:nvPr/>
+      </p:nvGrpSpPr>
+      <p:grpSpPr>
+        <a:xfrm>
+          <a:off x="0" y="0"/>
+          <a:ext cx="0" cy="0"/>
+          <a:chOff x="0" y="0"/>
+          <a:chExt cx="0" cy="0"/>
+        </a:xfrm>
+      </p:grpSpPr>
+      <p:sp>
+        <p:nvSpPr>
+          <p:cNvPr id="2" name="Title 1"/>
+          <p:cNvSpPr>
+            <a:spLocks noGrp="1"/>
+          </p:cNvSpPr>
+          <p:nvPr>
+            <p:ph type="title"/>
+          </p:nvPr>
+        </p:nvSpPr>
+        <p:spPr/>
+        <p:txBody>
+          <a:bodyPr/>
+          <a:lstStyle/>
+          <a:p>
+            <a:pPr lvl="0" indent="0" marL="0">
+              <a:buNone/>
+            </a:pPr>
+            <a:r>
+              <a:rPr/>
+              <a:t>STGraph - Conceptualization</a:t>
+            </a:r>
+          </a:p>
+        </p:txBody>
+      </p:sp>
+      <p:sp>
+        <p:nvSpPr>
+          <p:cNvPr id="3" name="Content Placeholder 2"/>
+          <p:cNvSpPr>
+            <a:spLocks noGrp="1"/>
+          </p:cNvSpPr>
+          <p:nvPr>
+            <p:ph idx="1"/>
+          </p:nvPr>
+        </p:nvSpPr>
+        <p:spPr/>
+        <p:txBody>
+          <a:bodyPr/>
+          <a:lstStyle/>
+          <a:p>
+            <a:pPr lvl="0"/>
+            <a:r>
+              <a:rPr/>
+              <a:t>Can we distinguish highly-temporal data from moderately-temporal data ?</a:t>
+            </a:r>
+          </a:p>
+          <a:p>
+            <a:pPr lvl="0"/>
+            <a:r>
+              <a:rPr/>
+              <a:t>If so, can we embed two different data-layout into the same conceptual storage system?</a:t>
+            </a:r>
+          </a:p>
+        </p:txBody>
+      </p:sp>
+      <p:pic>
+        <p:nvPicPr>
+          <p:cNvPr descr="https://raw.githubusercontent.com/ManuelePasini/slides-markdown/refs/heads/master/slides/images/ioanninaSlides/dt_graph.svg" id="0" name="Picture 1"/>
+          <p:cNvPicPr>
+            <a:picLocks noGrp="1" noChangeAspect="1"/>
+          </p:cNvPicPr>
+          <p:nvPr/>
+        </p:nvPicPr>
+        <p:blipFill>
+          <a:blip r:embed="rId2"/>
+          <a:stretch>
+            <a:fillRect/>
+          </a:stretch>
+        </p:blipFill>
+        <p:spPr bwMode="auto">
+          <a:xfrm>
+            <a:off x="2413000" y="1193800"/>
+            <a:ext cx="4318000" cy="2882900"/>
+          </a:xfrm>
+          <a:prstGeom prst="rect">
+            <a:avLst/>
+          </a:prstGeom>
+          <a:noFill/>
+          <a:ln w="9525">
+            <a:noFill/>
+            <a:headEnd/>
+            <a:tailEnd/>
+          </a:ln>
+        </p:spPr>
+      </p:pic>
+      <p:sp>
+        <p:nvSpPr>
+          <p:cNvPr id="1" name="TextBox 3"/>
+          <p:cNvSpPr txBox="1"/>
+          <p:nvPr/>
+        </p:nvSpPr>
+        <p:spPr>
+          <a:xfrm>
+            <a:off x="457200" y="4076700"/>
+            <a:ext cx="8229600" cy="508000"/>
+          </a:xfrm>
+          <a:prstGeom prst="rect">
+            <a:avLst/>
+          </a:prstGeom>
+          <a:noFill/>
+        </p:spPr>
+        <p:txBody>
+          <a:bodyPr/>
+          <a:lstStyle/>
+          <a:p>
+            <a:pPr lvl="0" indent="0" marL="0" algn="ctr">
+              <a:buNone/>
+            </a:pPr>
+            <a:r>
+              <a:rPr/>
+              <a:t>Graph+TimeSeries Hybrid data model</a:t>
             </a:r>
           </a:p>
         </p:txBody>

</xml_diff>

<commit_message>
Deploying to gh-pages from @ ManuelePasini/slides-markdown@a0d42c9a973b333a0080b657ec7f33c746a20c7c 🚀
</commit_message>
<xml_diff>
--- a/stgraph.pptx
+++ b/stgraph.pptx
@@ -8,6 +8,7 @@
     <p:sldId id="256" r:id="rId2"/>
     <p:sldId id="257" r:id="rId3"/>
     <p:sldId id="258" r:id="rId4"/>
+    <p:sldId id="259" r:id="rId5"/>
   </p:sldIdLst>
   <p:sldSz cx="9144000" cy="5143500" type="screen16x9"/>
   <p:notesSz cx="6858000" cy="9144000"/>
@@ -3398,7 +3399,7 @@
             <a:pPr lvl="0"/>
             <a:r>
               <a:rPr/>
-              <a:t>If so, can we embed two different data-layout into the same conceptual storage system?</a:t>
+              <a:t>If so, can we embed two different data-layout into the same conceptual storage system and provide hybrid capabilities?</a:t>
             </a:r>
           </a:p>
         </p:txBody>
@@ -3459,6 +3460,160 @@
             <a:r>
               <a:rPr/>
               <a:t>Graph+TimeSeries Hybrid data model</a:t>
+            </a:r>
+          </a:p>
+        </p:txBody>
+      </p:sp>
+    </p:spTree>
+  </p:cSld>
+</p:sld>
+</file>
+
+<file path=ppt/slides/slide4.xml><?xml version="1.0" encoding="utf-8"?>
+<p:sld xmlns:a="http://schemas.openxmlformats.org/drawingml/2006/main" xmlns:r="http://schemas.openxmlformats.org/officeDocument/2006/relationships" xmlns:p="http://schemas.openxmlformats.org/presentationml/2006/main">
+  <p:cSld>
+    <p:spTree>
+      <p:nvGrpSpPr>
+        <p:cNvPr id="1" name=""/>
+        <p:cNvGrpSpPr/>
+        <p:nvPr/>
+      </p:nvGrpSpPr>
+      <p:grpSpPr>
+        <a:xfrm>
+          <a:off x="0" y="0"/>
+          <a:ext cx="0" cy="0"/>
+          <a:chOff x="0" y="0"/>
+          <a:chExt cx="0" cy="0"/>
+        </a:xfrm>
+      </p:grpSpPr>
+      <p:sp>
+        <p:nvSpPr>
+          <p:cNvPr id="2" name="Title 1"/>
+          <p:cNvSpPr>
+            <a:spLocks noGrp="1"/>
+          </p:cNvSpPr>
+          <p:nvPr>
+            <p:ph type="title"/>
+          </p:nvPr>
+        </p:nvSpPr>
+        <p:spPr/>
+        <p:txBody>
+          <a:bodyPr/>
+          <a:lstStyle/>
+          <a:p>
+            <a:pPr lvl="0" indent="0" marL="0">
+              <a:buNone/>
+            </a:pPr>
+            <a:r>
+              <a:rPr/>
+              <a:t>STGraph - Implementation</a:t>
+            </a:r>
+          </a:p>
+        </p:txBody>
+      </p:sp>
+      <p:sp>
+        <p:nvSpPr>
+          <p:cNvPr id="3" name="Content Placeholder 2"/>
+          <p:cNvSpPr>
+            <a:spLocks noGrp="1"/>
+          </p:cNvSpPr>
+          <p:nvPr>
+            <p:ph idx="1"/>
+          </p:nvPr>
+        </p:nvSpPr>
+        <p:spPr/>
+        <p:txBody>
+          <a:bodyPr/>
+          <a:lstStyle/>
+          <a:p>
+            <a:pPr lvl="0"/>
+            <a:r>
+              <a:rPr/>
+              <a:t>Implemented in Kotlin;</a:t>
+            </a:r>
+          </a:p>
+          <a:p>
+            <a:pPr lvl="0"/>
+            <a:r>
+              <a:rPr/>
+              <a:t>Graph data layout</a:t>
+            </a:r>
+          </a:p>
+          <a:p>
+            <a:pPr lvl="1"/>
+            <a:r>
+              <a:rPr/>
+              <a:t>based on index-free adjacency;</a:t>
+            </a:r>
+          </a:p>
+          <a:p>
+            <a:pPr lvl="1"/>
+            <a:r>
+              <a:rPr/>
+              <a:t>time dimension as first citizen;</a:t>
+            </a:r>
+          </a:p>
+          <a:p>
+            <a:pPr lvl="1"/>
+            <a:r>
+              <a:rPr/>
+              <a:t>properties and edges are represented as a linked chain of pointers;</a:t>
+            </a:r>
+          </a:p>
+          <a:p>
+            <a:pPr lvl="1"/>
+            <a:r>
+              <a:rPr/>
+              <a:t>properties values bigger than 8 bytes (e.g. strings, geometries) are stored in a dynamic storage (RocksDB).</a:t>
+            </a:r>
+          </a:p>
+          <a:p>
+            <a:pPr lvl="1"/>
+            <a:r>
+              <a:rPr/>
+              <a:t>supports spatial operations (e.g., ST_INTERSECTS)</a:t>
+            </a:r>
+          </a:p>
+          <a:p>
+            <a:pPr lvl="0"/>
+            <a:r>
+              <a:rPr/>
+              <a:t>Time-Series data layout</a:t>
+            </a:r>
+          </a:p>
+          <a:p>
+            <a:pPr lvl="1"/>
+            <a:r>
+              <a:rPr/>
+              <a:t>Implemented in AsterixDB BDMS</a:t>
+            </a:r>
+          </a:p>
+          <a:p>
+            <a:pPr lvl="1"/>
+            <a:r>
+              <a:rPr/>
+              <a:t>LSM-Tree based data layout</a:t>
+            </a:r>
+          </a:p>
+          <a:p>
+            <a:pPr lvl="1"/>
+            <a:r>
+              <a:rPr/>
+              <a:t>Native spatial capabilities.</a:t>
+            </a:r>
+          </a:p>
+          <a:p>
+            <a:pPr lvl="1"/>
+            <a:r>
+              <a:rPr/>
+              <a:t>Primary index on time dimension</a:t>
+            </a:r>
+          </a:p>
+          <a:p>
+            <a:pPr lvl="1"/>
+            <a:r>
+              <a:rPr/>
+              <a:t>Secondary index on spatial dimension</a:t>
             </a:r>
           </a:p>
         </p:txBody>

</xml_diff>

<commit_message>
Deploying to gh-pages from @ ManuelePasini/slides-markdown@47bfdc58b57a090afc8338de0ae9ae79cb9d8269 🚀
</commit_message>
<xml_diff>
--- a/stgraph.pptx
+++ b/stgraph.pptx
@@ -3529,13 +3529,13 @@
             <a:pPr lvl="0"/>
             <a:r>
               <a:rPr/>
-              <a:t>Implemented in Kotlin;</a:t>
+              <a:t>Implemented in Kotlin.</a:t>
             </a:r>
           </a:p>
           <a:p>
             <a:pPr lvl="0"/>
             <a:r>
-              <a:rPr/>
+              <a:rPr b="1"/>
               <a:t>Graph data layout</a:t>
             </a:r>
           </a:p>
@@ -3550,6 +3550,20 @@
             <a:pPr lvl="1"/>
             <a:r>
               <a:rPr/>
+              <a:t>properties and edges are represented as a linked chain of pointers;</a:t>
+            </a:r>
+          </a:p>
+          <a:p>
+            <a:pPr lvl="1"/>
+            <a:r>
+              <a:rPr/>
+              <a:t>properties values bigger than 8 bytes (e.g. strings, geometries) are stored in a dynamic storage (RocksDB);</a:t>
+            </a:r>
+          </a:p>
+          <a:p>
+            <a:pPr lvl="1"/>
+            <a:r>
+              <a:rPr/>
               <a:t>time dimension as first citizen;</a:t>
             </a:r>
           </a:p>
@@ -3557,63 +3571,49 @@
             <a:pPr lvl="1"/>
             <a:r>
               <a:rPr/>
-              <a:t>properties and edges are represented as a linked chain of pointers;</a:t>
+              <a:t>supports spatial operations (e.g., ST_INTERSECTS).</a:t>
+            </a:r>
+          </a:p>
+          <a:p>
+            <a:pPr lvl="0"/>
+            <a:r>
+              <a:rPr b="1"/>
+              <a:t>Time-Series data layout</a:t>
             </a:r>
           </a:p>
           <a:p>
             <a:pPr lvl="1"/>
             <a:r>
               <a:rPr/>
-              <a:t>properties values bigger than 8 bytes (e.g. strings, geometries) are stored in a dynamic storage (RocksDB).</a:t>
+              <a:t>Implemented in AsterixDB BDMS ;</a:t>
             </a:r>
           </a:p>
           <a:p>
             <a:pPr lvl="1"/>
             <a:r>
               <a:rPr/>
-              <a:t>supports spatial operations (e.g., ST_INTERSECTS)</a:t>
-            </a:r>
-          </a:p>
-          <a:p>
-            <a:pPr lvl="0"/>
+              <a:t>LSM-Tree based data layout ;</a:t>
+            </a:r>
+          </a:p>
+          <a:p>
+            <a:pPr lvl="1"/>
             <a:r>
               <a:rPr/>
-              <a:t>Time-Series data layout</a:t>
+              <a:t>Native spatial capabilities ;</a:t>
             </a:r>
           </a:p>
           <a:p>
             <a:pPr lvl="1"/>
             <a:r>
               <a:rPr/>
-              <a:t>Implemented in AsterixDB BDMS</a:t>
+              <a:t>Primary index on time dimension ;</a:t>
             </a:r>
           </a:p>
           <a:p>
             <a:pPr lvl="1"/>
             <a:r>
               <a:rPr/>
-              <a:t>LSM-Tree based data layout</a:t>
-            </a:r>
-          </a:p>
-          <a:p>
-            <a:pPr lvl="1"/>
-            <a:r>
-              <a:rPr/>
-              <a:t>Native spatial capabilities.</a:t>
-            </a:r>
-          </a:p>
-          <a:p>
-            <a:pPr lvl="1"/>
-            <a:r>
-              <a:rPr/>
-              <a:t>Primary index on time dimension</a:t>
-            </a:r>
-          </a:p>
-          <a:p>
-            <a:pPr lvl="1"/>
-            <a:r>
-              <a:rPr/>
-              <a:t>Secondary index on spatial dimension</a:t>
+              <a:t>Secondary index on spatial dimension .</a:t>
             </a:r>
           </a:p>
         </p:txBody>

</xml_diff>

<commit_message>
Deploying to gh-pages from @ ManuelePasini/slides-markdown@5c5c762b19c27be8005570e60dad68bcabf6d69c 🚀
</commit_message>
<xml_diff>
--- a/stgraph.pptx
+++ b/stgraph.pptx
@@ -9,6 +9,7 @@
     <p:sldId id="257" r:id="rId3"/>
     <p:sldId id="258" r:id="rId4"/>
     <p:sldId id="259" r:id="rId5"/>
+    <p:sldId id="260" r:id="rId6"/>
   </p:sldIdLst>
   <p:sldSz cx="9144000" cy="5143500" type="screen16x9"/>
   <p:notesSz cx="6858000" cy="9144000"/>
@@ -3543,7 +3544,7 @@
             <a:pPr lvl="1"/>
             <a:r>
               <a:rPr/>
-              <a:t>based on index-free adjacency;</a:t>
+              <a:t>based on index-free adjacency through nodes, edges, and property files.</a:t>
             </a:r>
           </a:p>
           <a:p>
@@ -3554,10 +3555,10 @@
             </a:r>
           </a:p>
           <a:p>
-            <a:pPr lvl="1"/>
+            <a:pPr lvl="2"/>
             <a:r>
               <a:rPr/>
-              <a:t>properties values bigger than 8 bytes (e.g. strings, geometries) are stored in a dynamic storage (RocksDB);</a:t>
+              <a:t>values &gt; 8 bytes (e.g. strings, geometries) are stored in a dynamic storage (RocksDB);</a:t>
             </a:r>
           </a:p>
           <a:p>
@@ -3571,7 +3572,7 @@
             <a:pPr lvl="1"/>
             <a:r>
               <a:rPr/>
-              <a:t>supports spatial operations (e.g., ST_INTERSECTS).</a:t>
+              <a:t>supports spatial join operations (e.g., ST_INTERSECTS).</a:t>
             </a:r>
           </a:p>
           <a:p>
@@ -3614,6 +3615,125 @@
             <a:r>
               <a:rPr/>
               <a:t>Secondary index on spatial dimension .</a:t>
+            </a:r>
+          </a:p>
+        </p:txBody>
+      </p:sp>
+    </p:spTree>
+  </p:cSld>
+</p:sld>
+</file>
+
+<file path=ppt/slides/slide5.xml><?xml version="1.0" encoding="utf-8"?>
+<p:sld xmlns:a="http://schemas.openxmlformats.org/drawingml/2006/main" xmlns:r="http://schemas.openxmlformats.org/officeDocument/2006/relationships" xmlns:p="http://schemas.openxmlformats.org/presentationml/2006/main">
+  <p:cSld>
+    <p:spTree>
+      <p:nvGrpSpPr>
+        <p:cNvPr id="1" name=""/>
+        <p:cNvGrpSpPr/>
+        <p:nvPr/>
+      </p:nvGrpSpPr>
+      <p:grpSpPr>
+        <a:xfrm>
+          <a:off x="0" y="0"/>
+          <a:ext cx="0" cy="0"/>
+          <a:chOff x="0" y="0"/>
+          <a:chExt cx="0" cy="0"/>
+        </a:xfrm>
+      </p:grpSpPr>
+      <p:sp>
+        <p:nvSpPr>
+          <p:cNvPr id="2" name="Title 1"/>
+          <p:cNvSpPr>
+            <a:spLocks noGrp="1"/>
+          </p:cNvSpPr>
+          <p:nvPr>
+            <p:ph type="title"/>
+          </p:nvPr>
+        </p:nvSpPr>
+        <p:spPr/>
+        <p:txBody>
+          <a:bodyPr/>
+          <a:lstStyle/>
+          <a:p>
+            <a:pPr lvl="0" indent="0" marL="0">
+              <a:buNone/>
+            </a:pPr>
+            <a:r>
+              <a:rPr/>
+              <a:t>STGraph - Operations</a:t>
+            </a:r>
+          </a:p>
+        </p:txBody>
+      </p:sp>
+      <p:sp>
+        <p:nvSpPr>
+          <p:cNvPr id="3" name="Content Placeholder 2"/>
+          <p:cNvSpPr>
+            <a:spLocks noGrp="1"/>
+          </p:cNvSpPr>
+          <p:nvPr>
+            <p:ph idx="1"/>
+          </p:nvPr>
+        </p:nvSpPr>
+        <p:spPr/>
+        <p:txBody>
+          <a:bodyPr/>
+          <a:lstStyle/>
+          <a:p>
+            <a:pPr lvl="0"/>
+            <a:r>
+              <a:rPr/>
+              <a:t>Search Algorithm&lt;:</a:t>
+            </a:r>
+          </a:p>
+          <a:p>
+            <a:pPr lvl="1"/>
+            <a:r>
+              <a:rPr/>
+              <a:t>Temporal DFS, temporal feasibility check based on constraint tightening:</a:t>
+            </a:r>
+          </a:p>
+          <a:p>
+            <a:pPr lvl="2"/>
+            <a:r>
+              <a:rPr/>
+              <a:t>[t_A^s, t_A^e) [t_B^s, t_B^e) (t_A^s, t_B^s) &lt; (t_A^e, t_B^e)</a:t>
+            </a:r>
+          </a:p>
+          <a:p>
+            <a:pPr lvl="0"/>
+            <a:r>
+              <a:rPr b="1"/>
+              <a:t>GraphNode2GraphNode</a:t>
+            </a:r>
+          </a:p>
+          <a:p>
+            <a:pPr lvl="0"/>
+            <a:r>
+              <a:rPr b="1"/>
+              <a:t>GraphNode-TSNode</a:t>
+            </a:r>
+          </a:p>
+          <a:p>
+            <a:pPr lvl="0"/>
+            <a:r>
+              <a:rPr/>
+              <a:t>Furthermore</a:t>
+            </a:r>
+          </a:p>
+          <a:p>
+            <a:pPr lvl="1"/>
+            <a:r>
+              <a:rPr/>
+              <a:t>Join: Nested-Join Loop;</a:t>
+            </a:r>
+          </a:p>
+          <a:p>
+            <a:pPr lvl="1"/>
+            <a:r>
+              <a:rPr/>
+              <a:t>Temporal traversal: monotonic validity window</a:t>
             </a:r>
           </a:p>
         </p:txBody>

</xml_diff>

<commit_message>
Deploying to gh-pages from @ ManuelePasini/slides-markdown@845c2656c1a3043d03fb1e73b75525f085eea4c8 🚀
</commit_message>
<xml_diff>
--- a/stgraph.pptx
+++ b/stgraph.pptx
@@ -3684,7 +3684,7 @@
             <a:pPr lvl="0"/>
             <a:r>
               <a:rPr/>
-              <a:t>Search Algorithm&lt;:</a:t>
+              <a:t>Search algorithm:</a:t>
             </a:r>
           </a:p>
           <a:p>
@@ -3695,17 +3695,24 @@
             </a:r>
           </a:p>
           <a:p>
-            <a:pPr lvl="2"/>
+            <a:pPr lvl="1"/>
             <a:r>
               <a:rPr/>
-              <a:t>[t_A^s, t_A^e) ∩ [t_B^s, t_B^e) ≠ ∅ ⇔ max(t_A^s, t_B^s) &lt; min(t_A^e, t_B^e)</a:t>
+              <a:t>[tAs, tAe) ∩ [tBs, tBe) ≠ ∅ ⇔ max(tAs, tBs) &lt; min(tAe, tBe)</a:t>
+            </a:r>
+          </a:p>
+          <a:p>
+            <a:pPr lvl="1"/>
+            <a:r>
+              <a:rPr/>
+              <a:t>[tAs, tAe) ∩ [tBs, tBe) ≠ ∅ ⇔ max(tAs, tBs) &lt; min(tAe, tBe)</a:t>
             </a:r>
           </a:p>
           <a:p>
             <a:pPr lvl="0"/>
             <a:r>
-              <a:rPr b="1"/>
-              <a:t>GraphNode2GraphNode</a:t>
+              <a:rPr/>
+              <a:t>Join strategy: Nested-Loop;</a:t>
             </a:r>
           </a:p>
           <a:p>
@@ -3716,24 +3723,10 @@
             </a:r>
           </a:p>
           <a:p>
-            <a:pPr lvl="0"/>
+            <a:pPr lvl="1"/>
             <a:r>
               <a:rPr/>
-              <a:t>Furthermore</a:t>
-            </a:r>
-          </a:p>
-          <a:p>
-            <a:pPr lvl="1"/>
-            <a:r>
-              <a:rPr/>
-              <a:t>Join: Nested-Join Loop;</a:t>
-            </a:r>
-          </a:p>
-          <a:p>
-            <a:pPr lvl="1"/>
-            <a:r>
-              <a:rPr/>
-              <a:t>Temporal traversal: monotonic validity window</a:t>
+              <a:t>Each time a traversal goes through a virtual edge</a:t>
             </a:r>
           </a:p>
         </p:txBody>

</xml_diff>

<commit_message>
Deploying to gh-pages from @ ManuelePasini/slides-markdown@52177e4024150cd7060daa41928413c5f6fcb637 🚀
</commit_message>
<xml_diff>
--- a/stgraph.pptx
+++ b/stgraph.pptx
@@ -3400,7 +3400,7 @@
             <a:pPr lvl="0"/>
             <a:r>
               <a:rPr/>
-              <a:t>If so, can we embed two different data-layout into the same conceptual storage system and provide hybrid capabilities?</a:t>
+              <a:t>If so, can we embed two different data-layout into the same conceptual storage system and provide hybrid capabilities? :::: {.columns} ::: {.column width=“50%”}</a:t>
             </a:r>
           </a:p>
         </p:txBody>
@@ -3461,6 +3461,82 @@
             <a:r>
               <a:rPr/>
               <a:t>Graph+TimeSeries Hybrid data model</a:t>
+            </a:r>
+          </a:p>
+        </p:txBody>
+      </p:sp>
+      <p:sp>
+        <p:nvSpPr>
+          <p:cNvPr id="3" name="Content Placeholder 2"/>
+          <p:cNvSpPr>
+            <a:spLocks noGrp="1"/>
+          </p:cNvSpPr>
+          <p:nvPr>
+            <p:ph idx="1"/>
+          </p:nvPr>
+        </p:nvSpPr>
+        <p:spPr/>
+        <p:txBody>
+          <a:bodyPr/>
+          <a:lstStyle/>
+          <a:p>
+            <a:pPr lvl="0" indent="0" marL="0">
+              <a:buNone/>
+            </a:pPr>
+            <a:r>
+              <a:rPr/>
+              <a:t>::: ::: {.column width=“50%”}</a:t>
+            </a:r>
+          </a:p>
+          <a:p>
+            <a:pPr lvl="0"/>
+            <a:r>
+              <a:rPr/>
+              <a:t>Nodes</a:t>
+            </a:r>
+          </a:p>
+          <a:p>
+            <a:pPr lvl="1"/>
+            <a:r>
+              <a:rPr/>
+              <a:t>Graph node;</a:t>
+            </a:r>
+          </a:p>
+          <a:p>
+            <a:pPr lvl="1"/>
+            <a:r>
+              <a:rPr/>
+              <a:t>Time-Series node;</a:t>
+            </a:r>
+          </a:p>
+          <a:p>
+            <a:pPr lvl="0"/>
+            <a:r>
+              <a:rPr/>
+              <a:t>Edges</a:t>
+            </a:r>
+          </a:p>
+          <a:p>
+            <a:pPr lvl="1"/>
+            <a:r>
+              <a:rPr/>
+              <a:t>Graph edge (to a graph node);</a:t>
+            </a:r>
+          </a:p>
+          <a:p>
+            <a:pPr lvl="1"/>
+            <a:r>
+              <a:rPr/>
+              <a:t>Virtual edge (to a Time-Series node)</a:t>
+            </a:r>
+          </a:p>
+          <a:p>
+            <a:pPr lvl="0" indent="0" marL="0">
+              <a:buNone/>
+            </a:pPr>
+            <a:r>
+              <a:rPr/>
+              <a:t>::: ::::</a:t>
             </a:r>
           </a:p>
         </p:txBody>

</xml_diff>

<commit_message>
Deploying to gh-pages from @ ManuelePasini/slides-markdown@28572e3bc399b059cd89a0011759f908e3f048b1 🚀
</commit_message>
<xml_diff>
--- a/stgraph.pptx
+++ b/stgraph.pptx
@@ -3782,6 +3782,13 @@
             <a:r>
               <a:rPr/>
               <a:t>[tAs, tAe) ∩ [tBs, tBe) ≠ ∅ ⇔ max(tAs, tBs) &lt; min(tAe, tBe)</a:t>
+            </a:r>
+          </a:p>
+          <a:p>
+            <a:pPr lvl="1"/>
+            <a:r>
+              <a:rPr/>
+              <a:t>Ia ∩ Ib ≠ ∅</a:t>
             </a:r>
           </a:p>
           <a:p>

</xml_diff>

<commit_message>
Deploying to gh-pages from @ ManuelePasini/slides-markdown@8018f674a051f2c68d769a75e96ff81fb676d4d8 🚀
</commit_message>
<xml_diff>
--- a/stgraph.pptx
+++ b/stgraph.pptx
@@ -10,6 +10,7 @@
     <p:sldId id="258" r:id="rId4"/>
     <p:sldId id="259" r:id="rId5"/>
     <p:sldId id="260" r:id="rId6"/>
+    <p:sldId id="261" r:id="rId7"/>
   </p:sldIdLst>
   <p:sldSz cx="9144000" cy="5143500" type="screen16x9"/>
   <p:notesSz cx="6858000" cy="9144000"/>
@@ -3400,143 +3401,7 @@
             <a:pPr lvl="0"/>
             <a:r>
               <a:rPr/>
-              <a:t>If so, can we embed two different data-layout into the same conceptual storage system and provide hybrid capabilities? :::: {.columns} ::: {.column width=“50%”}</a:t>
-            </a:r>
-          </a:p>
-        </p:txBody>
-      </p:sp>
-      <p:pic>
-        <p:nvPicPr>
-          <p:cNvPr descr="https://raw.githubusercontent.com/ManuelePasini/slides-markdown/refs/heads/master/slides/images/ioanninaSlides/dt_graph.svg" id="0" name="Picture 1"/>
-          <p:cNvPicPr>
-            <a:picLocks noGrp="1" noChangeAspect="1"/>
-          </p:cNvPicPr>
-          <p:nvPr/>
-        </p:nvPicPr>
-        <p:blipFill>
-          <a:blip r:embed="rId2"/>
-          <a:stretch>
-            <a:fillRect/>
-          </a:stretch>
-        </p:blipFill>
-        <p:spPr bwMode="auto">
-          <a:xfrm>
-            <a:off x="2413000" y="1193800"/>
-            <a:ext cx="4318000" cy="2882900"/>
-          </a:xfrm>
-          <a:prstGeom prst="rect">
-            <a:avLst/>
-          </a:prstGeom>
-          <a:noFill/>
-          <a:ln w="9525">
-            <a:noFill/>
-            <a:headEnd/>
-            <a:tailEnd/>
-          </a:ln>
-        </p:spPr>
-      </p:pic>
-      <p:sp>
-        <p:nvSpPr>
-          <p:cNvPr id="1" name="TextBox 3"/>
-          <p:cNvSpPr txBox="1"/>
-          <p:nvPr/>
-        </p:nvSpPr>
-        <p:spPr>
-          <a:xfrm>
-            <a:off x="457200" y="4076700"/>
-            <a:ext cx="8229600" cy="508000"/>
-          </a:xfrm>
-          <a:prstGeom prst="rect">
-            <a:avLst/>
-          </a:prstGeom>
-          <a:noFill/>
-        </p:spPr>
-        <p:txBody>
-          <a:bodyPr/>
-          <a:lstStyle/>
-          <a:p>
-            <a:pPr lvl="0" indent="0" marL="0" algn="ctr">
-              <a:buNone/>
-            </a:pPr>
-            <a:r>
-              <a:rPr/>
-              <a:t>Graph+TimeSeries Hybrid data model</a:t>
-            </a:r>
-          </a:p>
-        </p:txBody>
-      </p:sp>
-      <p:sp>
-        <p:nvSpPr>
-          <p:cNvPr id="3" name="Content Placeholder 2"/>
-          <p:cNvSpPr>
-            <a:spLocks noGrp="1"/>
-          </p:cNvSpPr>
-          <p:nvPr>
-            <p:ph idx="1"/>
-          </p:nvPr>
-        </p:nvSpPr>
-        <p:spPr/>
-        <p:txBody>
-          <a:bodyPr/>
-          <a:lstStyle/>
-          <a:p>
-            <a:pPr lvl="0" indent="0" marL="0">
-              <a:buNone/>
-            </a:pPr>
-            <a:r>
-              <a:rPr/>
-              <a:t>::: ::: {.column width=“50%”}</a:t>
-            </a:r>
-          </a:p>
-          <a:p>
-            <a:pPr lvl="0"/>
-            <a:r>
-              <a:rPr/>
-              <a:t>Nodes</a:t>
-            </a:r>
-          </a:p>
-          <a:p>
-            <a:pPr lvl="1"/>
-            <a:r>
-              <a:rPr/>
-              <a:t>Graph node;</a:t>
-            </a:r>
-          </a:p>
-          <a:p>
-            <a:pPr lvl="1"/>
-            <a:r>
-              <a:rPr/>
-              <a:t>Time-Series node;</a:t>
-            </a:r>
-          </a:p>
-          <a:p>
-            <a:pPr lvl="0"/>
-            <a:r>
-              <a:rPr/>
-              <a:t>Edges</a:t>
-            </a:r>
-          </a:p>
-          <a:p>
-            <a:pPr lvl="1"/>
-            <a:r>
-              <a:rPr/>
-              <a:t>Graph edge (to a graph node);</a:t>
-            </a:r>
-          </a:p>
-          <a:p>
-            <a:pPr lvl="1"/>
-            <a:r>
-              <a:rPr/>
-              <a:t>Virtual edge (to a Time-Series node)</a:t>
-            </a:r>
-          </a:p>
-          <a:p>
-            <a:pPr lvl="0" indent="0" marL="0">
-              <a:buNone/>
-            </a:pPr>
-            <a:r>
-              <a:rPr/>
-              <a:t>::: ::::</a:t>
+              <a:t>If so, can we embed two different data-layout into the same conceptual storage system and provide hybrid capabilities?</a:t>
             </a:r>
           </a:p>
         </p:txBody>
@@ -3563,39 +3428,74 @@
           <a:chExt cx="0" cy="0"/>
         </a:xfrm>
       </p:grpSpPr>
-      <p:sp>
-        <p:nvSpPr>
-          <p:cNvPr id="2" name="Title 1"/>
-          <p:cNvSpPr>
-            <a:spLocks noGrp="1"/>
-          </p:cNvSpPr>
-          <p:nvPr>
-            <p:ph type="title"/>
-          </p:nvPr>
-        </p:nvSpPr>
-        <p:spPr/>
-        <p:txBody>
-          <a:bodyPr/>
-          <a:lstStyle/>
-          <a:p>
-            <a:pPr lvl="0" indent="0" marL="0">
+      <p:pic>
+        <p:nvPicPr>
+          <p:cNvPr descr="https://raw.githubusercontent.com/ManuelePasini/slides-markdown/refs/heads/master/slides/images/ioanninaSlides/dt_graph.svg" id="0" name="Picture 1"/>
+          <p:cNvPicPr>
+            <a:picLocks noGrp="1" noChangeAspect="1"/>
+          </p:cNvPicPr>
+          <p:nvPr/>
+        </p:nvPicPr>
+        <p:blipFill>
+          <a:blip r:embed="rId2"/>
+          <a:stretch>
+            <a:fillRect/>
+          </a:stretch>
+        </p:blipFill>
+        <p:spPr bwMode="auto">
+          <a:xfrm>
+            <a:off x="457200" y="1295400"/>
+            <a:ext cx="4038600" cy="2692400"/>
+          </a:xfrm>
+          <a:prstGeom prst="rect">
+            <a:avLst/>
+          </a:prstGeom>
+          <a:noFill/>
+          <a:ln w="9525">
+            <a:noFill/>
+            <a:headEnd/>
+            <a:tailEnd/>
+          </a:ln>
+        </p:spPr>
+      </p:pic>
+      <p:sp>
+        <p:nvSpPr>
+          <p:cNvPr id="1" name="TextBox 3"/>
+          <p:cNvSpPr txBox="1"/>
+          <p:nvPr/>
+        </p:nvSpPr>
+        <p:spPr>
+          <a:xfrm>
+            <a:off x="457200" y="4076700"/>
+            <a:ext cx="4038600" cy="508000"/>
+          </a:xfrm>
+          <a:prstGeom prst="rect">
+            <a:avLst/>
+          </a:prstGeom>
+          <a:noFill/>
+        </p:spPr>
+        <p:txBody>
+          <a:bodyPr/>
+          <a:lstStyle/>
+          <a:p>
+            <a:pPr lvl="0" indent="0" marL="0" algn="ctr">
               <a:buNone/>
             </a:pPr>
             <a:r>
               <a:rPr/>
-              <a:t>STGraph - Implementation</a:t>
-            </a:r>
-          </a:p>
-        </p:txBody>
-      </p:sp>
-      <p:sp>
-        <p:nvSpPr>
-          <p:cNvPr id="3" name="Content Placeholder 2"/>
-          <p:cNvSpPr>
-            <a:spLocks noGrp="1"/>
-          </p:cNvSpPr>
-          <p:nvPr>
-            <p:ph idx="1"/>
+              <a:t>Graph+TimeSeries Hybrid data model</a:t>
+            </a:r>
+          </a:p>
+        </p:txBody>
+      </p:sp>
+      <p:sp>
+        <p:nvSpPr>
+          <p:cNvPr id="4" name="Content Placeholder 3"/>
+          <p:cNvSpPr>
+            <a:spLocks noGrp="1"/>
+          </p:cNvSpPr>
+          <p:nvPr>
+            <p:ph idx="2" sz="half"/>
           </p:nvPr>
         </p:nvSpPr>
         <p:spPr/>
@@ -3606,91 +3506,42 @@
             <a:pPr lvl="0"/>
             <a:r>
               <a:rPr/>
-              <a:t>Implemented in Kotlin.</a:t>
+              <a:t>Nodes</a:t>
+            </a:r>
+          </a:p>
+          <a:p>
+            <a:pPr lvl="1"/>
+            <a:r>
+              <a:rPr/>
+              <a:t>Graph node;</a:t>
+            </a:r>
+          </a:p>
+          <a:p>
+            <a:pPr lvl="1"/>
+            <a:r>
+              <a:rPr/>
+              <a:t>Time-Series node;</a:t>
             </a:r>
           </a:p>
           <a:p>
             <a:pPr lvl="0"/>
             <a:r>
-              <a:rPr b="1"/>
-              <a:t>Graph data layout</a:t>
+              <a:rPr/>
+              <a:t>Edges</a:t>
             </a:r>
           </a:p>
           <a:p>
             <a:pPr lvl="1"/>
             <a:r>
               <a:rPr/>
-              <a:t>based on index-free adjacency through nodes, edges, and property files.</a:t>
+              <a:t>Graph edge (to a graph node);</a:t>
             </a:r>
           </a:p>
           <a:p>
             <a:pPr lvl="1"/>
             <a:r>
               <a:rPr/>
-              <a:t>properties and edges are represented as a linked chain of pointers;</a:t>
-            </a:r>
-          </a:p>
-          <a:p>
-            <a:pPr lvl="2"/>
-            <a:r>
-              <a:rPr/>
-              <a:t>values &gt; 8 bytes (e.g. strings, geometries) are stored in a dynamic storage (RocksDB);</a:t>
-            </a:r>
-          </a:p>
-          <a:p>
-            <a:pPr lvl="1"/>
-            <a:r>
-              <a:rPr/>
-              <a:t>time dimension as first citizen;</a:t>
-            </a:r>
-          </a:p>
-          <a:p>
-            <a:pPr lvl="1"/>
-            <a:r>
-              <a:rPr/>
-              <a:t>supports spatial join operations (e.g., ST_INTERSECTS).</a:t>
-            </a:r>
-          </a:p>
-          <a:p>
-            <a:pPr lvl="0"/>
-            <a:r>
-              <a:rPr b="1"/>
-              <a:t>Time-Series data layout</a:t>
-            </a:r>
-          </a:p>
-          <a:p>
-            <a:pPr lvl="1"/>
-            <a:r>
-              <a:rPr/>
-              <a:t>Implemented in AsterixDB BDMS ;</a:t>
-            </a:r>
-          </a:p>
-          <a:p>
-            <a:pPr lvl="1"/>
-            <a:r>
-              <a:rPr/>
-              <a:t>LSM-Tree based data layout ;</a:t>
-            </a:r>
-          </a:p>
-          <a:p>
-            <a:pPr lvl="1"/>
-            <a:r>
-              <a:rPr/>
-              <a:t>Native spatial capabilities ;</a:t>
-            </a:r>
-          </a:p>
-          <a:p>
-            <a:pPr lvl="1"/>
-            <a:r>
-              <a:rPr/>
-              <a:t>Primary index on time dimension ;</a:t>
-            </a:r>
-          </a:p>
-          <a:p>
-            <a:pPr lvl="1"/>
-            <a:r>
-              <a:rPr/>
-              <a:t>Secondary index on spatial dimension .</a:t>
+              <a:t>Virtual edge (to a Time-Series node)</a:t>
             </a:r>
           </a:p>
         </p:txBody>
@@ -3701,6 +3552,160 @@
 </file>
 
 <file path=ppt/slides/slide5.xml><?xml version="1.0" encoding="utf-8"?>
+<p:sld xmlns:a="http://schemas.openxmlformats.org/drawingml/2006/main" xmlns:r="http://schemas.openxmlformats.org/officeDocument/2006/relationships" xmlns:p="http://schemas.openxmlformats.org/presentationml/2006/main">
+  <p:cSld>
+    <p:spTree>
+      <p:nvGrpSpPr>
+        <p:cNvPr id="1" name=""/>
+        <p:cNvGrpSpPr/>
+        <p:nvPr/>
+      </p:nvGrpSpPr>
+      <p:grpSpPr>
+        <a:xfrm>
+          <a:off x="0" y="0"/>
+          <a:ext cx="0" cy="0"/>
+          <a:chOff x="0" y="0"/>
+          <a:chExt cx="0" cy="0"/>
+        </a:xfrm>
+      </p:grpSpPr>
+      <p:sp>
+        <p:nvSpPr>
+          <p:cNvPr id="2" name="Title 1"/>
+          <p:cNvSpPr>
+            <a:spLocks noGrp="1"/>
+          </p:cNvSpPr>
+          <p:nvPr>
+            <p:ph type="title"/>
+          </p:nvPr>
+        </p:nvSpPr>
+        <p:spPr/>
+        <p:txBody>
+          <a:bodyPr/>
+          <a:lstStyle/>
+          <a:p>
+            <a:pPr lvl="0" indent="0" marL="0">
+              <a:buNone/>
+            </a:pPr>
+            <a:r>
+              <a:rPr/>
+              <a:t>STGraph - Implementation</a:t>
+            </a:r>
+          </a:p>
+        </p:txBody>
+      </p:sp>
+      <p:sp>
+        <p:nvSpPr>
+          <p:cNvPr id="3" name="Content Placeholder 2"/>
+          <p:cNvSpPr>
+            <a:spLocks noGrp="1"/>
+          </p:cNvSpPr>
+          <p:nvPr>
+            <p:ph idx="1"/>
+          </p:nvPr>
+        </p:nvSpPr>
+        <p:spPr/>
+        <p:txBody>
+          <a:bodyPr/>
+          <a:lstStyle/>
+          <a:p>
+            <a:pPr lvl="0"/>
+            <a:r>
+              <a:rPr/>
+              <a:t>Implemented in Kotlin.</a:t>
+            </a:r>
+          </a:p>
+          <a:p>
+            <a:pPr lvl="0"/>
+            <a:r>
+              <a:rPr b="1"/>
+              <a:t>Graph data layout</a:t>
+            </a:r>
+          </a:p>
+          <a:p>
+            <a:pPr lvl="1"/>
+            <a:r>
+              <a:rPr/>
+              <a:t>based on index-free adjacency through nodes, edges, and property files.</a:t>
+            </a:r>
+          </a:p>
+          <a:p>
+            <a:pPr lvl="1"/>
+            <a:r>
+              <a:rPr/>
+              <a:t>properties and edges are represented as a linked chain of pointers;</a:t>
+            </a:r>
+          </a:p>
+          <a:p>
+            <a:pPr lvl="2"/>
+            <a:r>
+              <a:rPr/>
+              <a:t>values &gt; 8 bytes (e.g. strings, geometries) are stored in a dynamic storage (RocksDB);</a:t>
+            </a:r>
+          </a:p>
+          <a:p>
+            <a:pPr lvl="1"/>
+            <a:r>
+              <a:rPr/>
+              <a:t>time dimension as first citizen;</a:t>
+            </a:r>
+          </a:p>
+          <a:p>
+            <a:pPr lvl="1"/>
+            <a:r>
+              <a:rPr/>
+              <a:t>supports spatial join operations (e.g., ST_INTERSECTS).</a:t>
+            </a:r>
+          </a:p>
+          <a:p>
+            <a:pPr lvl="0"/>
+            <a:r>
+              <a:rPr b="1"/>
+              <a:t>Time-Series data layout</a:t>
+            </a:r>
+          </a:p>
+          <a:p>
+            <a:pPr lvl="1"/>
+            <a:r>
+              <a:rPr/>
+              <a:t>Implemented in AsterixDB BDMS ;</a:t>
+            </a:r>
+          </a:p>
+          <a:p>
+            <a:pPr lvl="1"/>
+            <a:r>
+              <a:rPr/>
+              <a:t>LSM-Tree based data layout ;</a:t>
+            </a:r>
+          </a:p>
+          <a:p>
+            <a:pPr lvl="1"/>
+            <a:r>
+              <a:rPr/>
+              <a:t>Native spatial capabilities ;</a:t>
+            </a:r>
+          </a:p>
+          <a:p>
+            <a:pPr lvl="1"/>
+            <a:r>
+              <a:rPr/>
+              <a:t>Primary index on time dimension ;</a:t>
+            </a:r>
+          </a:p>
+          <a:p>
+            <a:pPr lvl="1"/>
+            <a:r>
+              <a:rPr/>
+              <a:t>Secondary index on spatial dimension .</a:t>
+            </a:r>
+          </a:p>
+        </p:txBody>
+      </p:sp>
+    </p:spTree>
+  </p:cSld>
+</p:sld>
+</file>
+
+<file path=ppt/slides/slide6.xml><?xml version="1.0" encoding="utf-8"?>
 <p:sld xmlns:a="http://schemas.openxmlformats.org/drawingml/2006/main" xmlns:r="http://schemas.openxmlformats.org/officeDocument/2006/relationships" xmlns:p="http://schemas.openxmlformats.org/presentationml/2006/main">
   <p:cSld>
     <p:spTree>

</xml_diff>

<commit_message>
Deploying to gh-pages from @ ManuelePasini/slides-markdown@db170cfcbbddc9ca0f136885b2f38c6d3063f8f2 🚀
</commit_message>
<xml_diff>
--- a/stgraph.pptx
+++ b/stgraph.pptx
@@ -3779,21 +3779,14 @@
             <a:pPr lvl="1"/>
             <a:r>
               <a:rPr/>
-              <a:t>[tAs, tAe) ∩ [tBs, tBe) ≠ ∅ ⇔ max(tAs, tBs) &lt; min(tAe, tBe)</a:t>
+              <a:t>⋂i=1..k Iei ≠ ∅</a:t>
             </a:r>
           </a:p>
           <a:p>
             <a:pPr lvl="1"/>
             <a:r>
               <a:rPr/>
-              <a:t>[tAs, tAe) ∩ [tBs, tBe) ≠ ∅ ⇔ max(tAs, tBs) &lt; min(tAe, tBe)</a:t>
-            </a:r>
-          </a:p>
-          <a:p>
-            <a:pPr lvl="1"/>
-            <a:r>
-              <a:rPr/>
-              <a:t>Ia ∩ Ib ≠ ∅</a:t>
+              <a:t>path(P) è valido ⇔ ⋂i=1..k Iei ≠ ∅</a:t>
             </a:r>
           </a:p>
           <a:p>

</xml_diff>

<commit_message>
Deploying to gh-pages from @ ManuelePasini/slides-markdown@5e73077b2df5968ee97fcf6c03ba5019040487c2 🚀
</commit_message>
<xml_diff>
--- a/stgraph.pptx
+++ b/stgraph.pptx
@@ -3765,28 +3765,16 @@
             <a:pPr lvl="0"/>
             <a:r>
               <a:rPr/>
-              <a:t>Search algorithm:</a:t>
-            </a:r>
-          </a:p>
-          <a:p>
-            <a:pPr lvl="1"/>
+              <a:t>Search algorithm: temporal DFS, temporal validity through constraint tightening: -</a:t>
+            </a:r>
+          </a:p>
+          <a:p>
+            <a:pPr lvl="1" indent="0" marL="342900">
+              <a:buNone/>
+            </a:pPr>
             <a:r>
               <a:rPr/>
-              <a:t>Temporal DFS, temporal feasibility check based on constraint tightening:</a:t>
-            </a:r>
-          </a:p>
-          <a:p>
-            <a:pPr lvl="1"/>
-            <a:r>
-              <a:rPr/>
-              <a:t>⋂i=1..k Iei ≠ ∅</a:t>
-            </a:r>
-          </a:p>
-          <a:p>
-            <a:pPr lvl="1"/>
-            <a:r>
-              <a:rPr/>
-              <a:t>path(P) è valido ⇔ ⋂i=1..k Iei ≠ ∅</a:t>
+              <a:t>Path(ni, …, nk) è valido ⇔ ⋂j=i..k Iej ≠ ∅</a:t>
             </a:r>
           </a:p>
           <a:p>
@@ -3799,8 +3787,8 @@
           <a:p>
             <a:pPr lvl="0"/>
             <a:r>
-              <a:rPr b="1"/>
-              <a:t>GraphNode-TSNode</a:t>
+              <a:rPr/>
+              <a:t>&gt;GraphNode-TSNode</a:t>
             </a:r>
           </a:p>
           <a:p>

</xml_diff>

<commit_message>
Deploying to gh-pages from @ ManuelePasini/slides-markdown@c544a63c0baf325c866bae6b25c7edece7db3ddd 🚀
</commit_message>
<xml_diff>
--- a/stgraph.pptx
+++ b/stgraph.pptx
@@ -3667,35 +3667,35 @@
             <a:pPr lvl="1"/>
             <a:r>
               <a:rPr/>
-              <a:t>Implemented in AsterixDB BDMS ;</a:t>
+              <a:t>Implemented in AsterixDB ;</a:t>
             </a:r>
           </a:p>
           <a:p>
             <a:pPr lvl="1"/>
             <a:r>
               <a:rPr/>
-              <a:t>LSM-Tree based data layout ;</a:t>
+              <a:t>LSM-Tree based;</a:t>
             </a:r>
           </a:p>
           <a:p>
             <a:pPr lvl="1"/>
             <a:r>
               <a:rPr/>
-              <a:t>Native spatial capabilities ;</a:t>
+              <a:t>Native spatial capabilities;</a:t>
             </a:r>
           </a:p>
           <a:p>
             <a:pPr lvl="1"/>
             <a:r>
               <a:rPr/>
-              <a:t>Primary index on time dimension ;</a:t>
+              <a:t>Primary index on time dimension;</a:t>
             </a:r>
           </a:p>
           <a:p>
             <a:pPr lvl="1"/>
             <a:r>
               <a:rPr/>
-              <a:t>Secondary index on spatial dimension .</a:t>
+              <a:t>Secondary index on spatial dimension.</a:t>
             </a:r>
           </a:p>
         </p:txBody>
@@ -3765,16 +3765,14 @@
             <a:pPr lvl="0"/>
             <a:r>
               <a:rPr/>
-              <a:t>Search algorithm: temporal DFS, temporal validity through constraint tightening: -</a:t>
-            </a:r>
-          </a:p>
-          <a:p>
-            <a:pPr lvl="1" indent="0" marL="342900">
-              <a:buNone/>
-            </a:pPr>
+              <a:t>Search algorithm: temporal DFS, temporal validity through constraint tightening:</a:t>
+            </a:r>
+          </a:p>
+          <a:p>
+            <a:pPr lvl="1"/>
             <a:r>
               <a:rPr/>
-              <a:t>Path(ni, …, nk) è valido ⇔ ⋂j=i..k Iej ≠ ∅</a:t>
+              <a:t>Path(ni, …, nk) è valido ⇔ ⋂j=i..k-1 I(nj,nj+1) ≠ ∅</a:t>
             </a:r>
           </a:p>
           <a:p>

</xml_diff>

<commit_message>
Deploying to gh-pages from @ ManuelePasini/slides-markdown@75911a59cd634136ac06e4b13b78de9b03c43ba4 🚀
</commit_message>
<xml_diff>
--- a/stgraph.pptx
+++ b/stgraph.pptx
@@ -3793,7 +3793,21 @@
             <a:pPr lvl="1"/>
             <a:r>
               <a:rPr/>
-              <a:t>Each time a traversal goes through a virtual edge</a:t>
+              <a:t>Each traversal of a virtual edge entails a query to AsterixDB.</a:t>
+            </a:r>
+          </a:p>
+          <a:p>
+            <a:pPr lvl="1"/>
+            <a:r>
+              <a:rPr/>
+              <a:t>Filter pushdown</a:t>
+            </a:r>
+          </a:p>
+          <a:p>
+            <a:pPr lvl="1"/>
+            <a:r>
+              <a:rPr/>
+              <a:t>No support for cross time-series operations</a:t>
             </a:r>
           </a:p>
         </p:txBody>

</xml_diff>

<commit_message>
Deploying to gh-pages from @ ManuelePasini/slides-markdown@e93b4c7c15539dce2612d8bb8823ae4609059262 🚀
</commit_message>
<xml_diff>
--- a/stgraph.pptx
+++ b/stgraph.pptx
@@ -3513,14 +3513,32 @@
             <a:pPr lvl="1"/>
             <a:r>
               <a:rPr/>
-              <a:t>Graph node;</a:t>
+              <a:t>Graph node</a:t>
+            </a:r>
+          </a:p>
+          <a:p>
+            <a:pPr lvl="2" indent="0" marL="685800">
+              <a:buNone/>
+            </a:pPr>
+            <a:r>
+              <a:rPr/>
+              <a:t>;</a:t>
             </a:r>
           </a:p>
           <a:p>
             <a:pPr lvl="1"/>
             <a:r>
               <a:rPr/>
-              <a:t>Time-Series node;</a:t>
+              <a:t>Time-Series node</a:t>
+            </a:r>
+          </a:p>
+          <a:p>
+            <a:pPr lvl="2" indent="0" marL="685800">
+              <a:buNone/>
+            </a:pPr>
+            <a:r>
+              <a:rPr/>
+              <a:t>;</a:t>
             </a:r>
           </a:p>
           <a:p>

</xml_diff>

<commit_message>
Deploying to gh-pages from @ ManuelePasini/slides-markdown@ebf409431b45108ad5a14cc3f02699eb1391af88 🚀
</commit_message>
<xml_diff>
--- a/stgraph.pptx
+++ b/stgraph.pptx
@@ -3513,32 +3513,14 @@
             <a:pPr lvl="1"/>
             <a:r>
               <a:rPr/>
-              <a:t>Graph node</a:t>
-            </a:r>
-          </a:p>
-          <a:p>
-            <a:pPr lvl="2" indent="0" marL="685800">
-              <a:buNone/>
-            </a:pPr>
+              <a:t>Graph node  ;</a:t>
+            </a:r>
+          </a:p>
+          <a:p>
+            <a:pPr lvl="1"/>
             <a:r>
               <a:rPr/>
-              <a:t>;</a:t>
-            </a:r>
-          </a:p>
-          <a:p>
-            <a:pPr lvl="1"/>
-            <a:r>
-              <a:rPr/>
-              <a:t>Time-Series node</a:t>
-            </a:r>
-          </a:p>
-          <a:p>
-            <a:pPr lvl="2" indent="0" marL="685800">
-              <a:buNone/>
-            </a:pPr>
-            <a:r>
-              <a:rPr/>
-              <a:t>;</a:t>
+              <a:t>Time-Series node  ;</a:t>
             </a:r>
           </a:p>
           <a:p>

</xml_diff>

<commit_message>
Deploying to gh-pages from @ ManuelePasini/slides-markdown@5dda1bb3c12309452c4c7601cf5237e226d07768 🚀
</commit_message>
<xml_diff>
--- a/stgraph.pptx
+++ b/stgraph.pptx
@@ -3772,7 +3772,7 @@
             <a:pPr lvl="1"/>
             <a:r>
               <a:rPr/>
-              <a:t>Path(ni, …, nk) è valido ⇔ ⋂j=i..k-1 I(nj,nj+1) ≠ ∅</a:t>
+              <a:t>Path(ni, …, nk) è valido ⇔ ⋂j=i..k-1 Ie(nj,nj+1) ≠ ∅</a:t>
             </a:r>
           </a:p>
           <a:p>
@@ -3786,28 +3786,28 @@
             <a:pPr lvl="0"/>
             <a:r>
               <a:rPr/>
-              <a:t>&gt;GraphNode-TSNode</a:t>
+              <a:t>Traversing a virtual edge:</a:t>
             </a:r>
           </a:p>
           <a:p>
             <a:pPr lvl="1"/>
             <a:r>
               <a:rPr/>
-              <a:t>Each traversal of a virtual edge entails a query to AsterixDB.</a:t>
+              <a:t>Entails a query to AsterixDB ;</a:t>
             </a:r>
           </a:p>
           <a:p>
             <a:pPr lvl="1"/>
             <a:r>
               <a:rPr/>
-              <a:t>Filter pushdown</a:t>
+              <a:t>Filter pushdown ;</a:t>
             </a:r>
           </a:p>
           <a:p>
             <a:pPr lvl="1"/>
             <a:r>
               <a:rPr/>
-              <a:t>No support for cross time-series operations</a:t>
+              <a:t>No support for cross time-series operations .</a:t>
             </a:r>
           </a:p>
         </p:txBody>

</xml_diff>

<commit_message>
Deploying to gh-pages from @ ManuelePasini/slides-markdown@f6a391dfd5a025f8060278f2007ace83f1c2edb8 🚀
</commit_message>
<xml_diff>
--- a/stgraph.pptx
+++ b/stgraph.pptx
@@ -3534,14 +3534,14 @@
             <a:pPr lvl="1"/>
             <a:r>
               <a:rPr/>
-              <a:t>Graph edge (to a graph node);</a:t>
+              <a:t>Graph edge  -&gt; ;</a:t>
             </a:r>
           </a:p>
           <a:p>
             <a:pPr lvl="1"/>
             <a:r>
               <a:rPr/>
-              <a:t>Virtual edge (to a Time-Series node)</a:t>
+              <a:t>Virtual edge  -&gt; </a:t>
             </a:r>
           </a:p>
         </p:txBody>
@@ -3696,6 +3696,13 @@
             <a:r>
               <a:rPr/>
               <a:t>Secondary index on spatial dimension.</a:t>
+            </a:r>
+          </a:p>
+          <a:p>
+            <a:pPr lvl="1"/>
+            <a:r>
+              <a:rPr/>
+              <a:t>Outgoing edges and properties are stored in a “fat” representation”.</a:t>
             </a:r>
           </a:p>
         </p:txBody>

</xml_diff>

<commit_message>
Deploying to gh-pages from @ ManuelePasini/slides-markdown@52786054120282ddfeec0934777d6edfb851e4fd 🚀
</commit_message>
<xml_diff>
--- a/stgraph.pptx
+++ b/stgraph.pptx
@@ -3626,28 +3626,28 @@
             <a:pPr lvl="1"/>
             <a:r>
               <a:rPr/>
-              <a:t>Based on index-free adjacency through fixed-size records stored in nodes, edges, and property files.</a:t>
+              <a:t>Index-free adjacency through fixed-size records stored in nodes, edges, and property files.</a:t>
             </a:r>
           </a:p>
           <a:p>
             <a:pPr lvl="1"/>
             <a:r>
               <a:rPr/>
-              <a:t>Properties and edges are represented as a linked chain of pointers;</a:t>
+              <a:t>Properties/edges represented as linked chain of pointers;</a:t>
             </a:r>
           </a:p>
           <a:p>
             <a:pPr lvl="2"/>
             <a:r>
               <a:rPr/>
-              <a:t>values &gt; 8 bytes (e.g. strings, geometries) are stored in a dynamic storage (RocksDB);</a:t>
+              <a:t>values &gt; 8 bytes (e.g. strings, geometries) stored in dynamic storage (RocksDB);</a:t>
             </a:r>
           </a:p>
           <a:p>
             <a:pPr lvl="1"/>
             <a:r>
               <a:rPr/>
-              <a:t>Time dimension as first citizen;</a:t>
+              <a:t>Time attribute as first citizen;</a:t>
             </a:r>
           </a:p>
           <a:p>
@@ -3682,7 +3682,7 @@
             <a:pPr lvl="1"/>
             <a:r>
               <a:rPr/>
-              <a:t>Properties and outgoing edges are stored as “fat” graph properties.</a:t>
+              <a:t>Properties/outgoing edges stored as “fat” graph properties.</a:t>
             </a:r>
           </a:p>
         </p:txBody>

</xml_diff>

<commit_message>
Deploying to gh-pages from @ ManuelePasini/slides-markdown@14e4157ebb31e4b3f124a3783d1fed590aa2e48d 🚀
</commit_message>
<xml_diff>
--- a/stgraph.pptx
+++ b/stgraph.pptx
@@ -3394,15 +3394,23 @@
           <a:p>
             <a:pPr lvl="0"/>
             <a:r>
-              <a:rPr/>
-              <a:t>Can we separate data by temporal granularity to support hybrid modeling across time-series and temporal graph systems?</a:t>
+              <a:rPr b="1"/>
+              <a:t>RQ1</a:t>
+            </a:r>
+            <a:r>
+              <a:rPr/>
+              <a:t> - Can we separate data by temporal granularity to support hybrid modeling across time-series and temporal graph systems?</a:t>
             </a:r>
           </a:p>
           <a:p>
             <a:pPr lvl="0"/>
             <a:r>
-              <a:rPr/>
-              <a:t>If so, can we embed two different data-layout into the same conceptual storage system and provide hybrid capabilities?</a:t>
+              <a:rPr b="1"/>
+              <a:t>RQ2</a:t>
+            </a:r>
+            <a:r>
+              <a:rPr/>
+              <a:t> - If so, can we embed two different data-layout into the same conceptual storage system and provide hybrid capabilities?</a:t>
             </a:r>
           </a:p>
         </p:txBody>

</xml_diff>

<commit_message>
Deploying to gh-pages from @ ManuelePasini/slides-markdown@03421780ba49ddd61d2a89368b96f7e6d9aec70c 🚀
</commit_message>
<xml_diff>
--- a/stgraph.pptx
+++ b/stgraph.pptx
@@ -3781,21 +3781,21 @@
             <a:pPr lvl="1"/>
             <a:r>
               <a:rPr/>
-              <a:t>Executed in three steps:</a:t>
+              <a:t>Executed in three iterative steps:</a:t>
             </a:r>
           </a:p>
           <a:p>
             <a:pPr lvl="2"/>
             <a:r>
               <a:rPr/>
-              <a:t>Graph exploration through DFS;</a:t>
+              <a:t>Path exploration through DFS;</a:t>
             </a:r>
           </a:p>
           <a:p>
             <a:pPr lvl="2"/>
             <a:r>
               <a:rPr/>
-              <a:t>Graph materialization: if exploring a virtual edge, materialize its virtual nodes;</a:t>
+              <a:t>Path materialization: if exploring a virtual edge, materialize its virtual nodes;</a:t>
             </a:r>
           </a:p>
           <a:p>

</xml_diff>

<commit_message>
Deploying to gh-pages from @ ManuelePasini/slides-markdown@836e58fefceaa406a4b2fd0eceb10d4adc5b6e0e 🚀
</commit_message>
<xml_diff>
--- a/stgraph.pptx
+++ b/stgraph.pptx
@@ -3928,14 +3928,14 @@
             <a:pPr lvl="1"/>
             <a:r>
               <a:rPr/>
-              <a:t>No support for cross time-series operations .</a:t>
+              <a:t>No support for cross time-series operations ;</a:t>
             </a:r>
           </a:p>
           <a:p>
             <a:pPr lvl="1"/>
             <a:r>
               <a:rPr/>
-              <a:t>Query to AsterixDB block path traversal algorithm (could by asynchronous)</a:t>
+              <a:t>Query to AsterixDB should be asynchronous ;</a:t>
             </a:r>
           </a:p>
         </p:txBody>

</xml_diff>

<commit_message>
Deploying to gh-pages from @ ManuelePasini/slides-markdown@9e13cdc019b5932844314cb0f04c28f65c1a5626 🚀
</commit_message>
<xml_diff>
--- a/stgraph.pptx
+++ b/stgraph.pptx
@@ -3788,7 +3788,7 @@
             <a:pPr lvl="2"/>
             <a:r>
               <a:rPr/>
-              <a:t>Path exploration through DFS;</a:t>
+              <a:t>Path exploration through temporal DFS;</a:t>
             </a:r>
           </a:p>
           <a:p>
@@ -3802,7 +3802,7 @@
             <a:pPr lvl="2"/>
             <a:r>
               <a:rPr/>
-              <a:t>Query solving.</a:t>
+              <a:t>Path filtering.</a:t>
             </a:r>
           </a:p>
           <a:p>

</xml_diff>

<commit_message>
Deploying to gh-pages from @ ManuelePasini/slides-markdown@4324c01de99f463c2cd451bf180530881c051000 🚀
</commit_message>
<xml_diff>
--- a/stgraph.pptx
+++ b/stgraph.pptx
@@ -3311,14 +3311,7 @@
             <a:pPr lvl="0"/>
             <a:r>
               <a:rPr/>
-              <a:t>Different data layouts imply different ingestion and workload capabilities…</a:t>
-            </a:r>
-          </a:p>
-          <a:p>
-            <a:pPr lvl="0"/>
-            <a:r>
-              <a:rPr/>
-              <a:t>Yet many modern data-intensive applications combine both, e.g., IoT systems, Digital Twins, and pervasive computing.</a:t>
+              <a:t>Different layouts ➔ different ingestion and workload capabilities… ➔ Yet many modern data-intensive applications combine both, e.g., IoT systems, Digital Twins, and pervasive computing.</a:t>
             </a:r>
           </a:p>
           <a:p>
@@ -3634,7 +3627,7 @@
             <a:pPr lvl="1"/>
             <a:r>
               <a:rPr/>
-              <a:t>Index-free adjacency through fixed-size records stored in nodes, edges, and property files.</a:t>
+              <a:t>Index-free adjacency through fixed-size records stored in node, edge, and property files.</a:t>
             </a:r>
           </a:p>
           <a:p>

</xml_diff>

<commit_message>
Deploying to gh-pages from @ ManuelePasini/slides-markdown@25a31da9304ba6eb1aa9432a7d471b75929e82b4 🚀
</commit_message>
<xml_diff>
--- a/stgraph.pptx
+++ b/stgraph.pptx
@@ -3392,7 +3392,7 @@
             </a:r>
             <a:r>
               <a:rPr/>
-              <a:t> - Can we separate data by temporal granularity to support hybrid modeling across time-series and temporal graph systems?</a:t>
+              <a:t> - How can we separate, within a specific domain, temporal graph data from time-series data?</a:t>
             </a:r>
           </a:p>
           <a:p>
@@ -3403,7 +3403,7 @@
             </a:r>
             <a:r>
               <a:rPr/>
-              <a:t> - If so, can we embed two different data-layout into the same conceptual storage system and provide hybrid capabilities?</a:t>
+              <a:t> - If so, can we embed both data layouts into the same conceptual storage system and provide hybrid capabilities?</a:t>
             </a:r>
           </a:p>
         </p:txBody>
@@ -3536,14 +3536,14 @@
             <a:pPr lvl="1"/>
             <a:r>
               <a:rPr/>
-              <a:t>Graph edge  &lt;–&gt; </a:t>
+              <a:t>Graph edge  ⟺ </a:t>
             </a:r>
           </a:p>
           <a:p>
             <a:pPr lvl="1"/>
             <a:r>
               <a:rPr/>
-              <a:t>Virtual edge  &lt;–&gt; </a:t>
+              <a:t>Virtual edge  ⟺ </a:t>
             </a:r>
           </a:p>
         </p:txBody>

</xml_diff>

<commit_message>
Deploying to gh-pages from @ ManuelePasini/slides-markdown@3401ff7f8319b81c05e51a87d768ccd0b2ad8603 🚀
</commit_message>
<xml_diff>
--- a/stgraph.pptx
+++ b/stgraph.pptx
@@ -3760,7 +3760,7 @@
             <a:pPr lvl="1"/>
             <a:r>
               <a:rPr/>
-              <a:t>isValid(Path(ni, …, nk)) ⇔ ⋂j=i..k-1 Ie(nj,nj+1) ≠ ∅, I = validityInterval(n)</a:t>
+              <a:t>isValid(Path(ni, …, nk)) ⇔ ⋂j=i..k-1 Ie(nj,nj+1) ≠ ∅, Ie = [ta; tb[</a:t>
             </a:r>
           </a:p>
           <a:p>
@@ -3816,7 +3816,7 @@
             <a:pPr lvl="2"/>
             <a:r>
               <a:rPr/>
-              <a:t>Output tuples are materialized as virtual nodes and connected within the graph.</a:t>
+              <a:t>Output tuples are materialized as nodes (dummy ID) and connected within the graph.</a:t>
             </a:r>
           </a:p>
           <a:p>

</xml_diff>

<commit_message>
Deploying to gh-pages from @ ManuelePasini/slides-markdown@e813586fa58869ef2626f64da3ab87a86614ba23 🚀
</commit_message>
<xml_diff>
--- a/stgraph.pptx
+++ b/stgraph.pptx
@@ -3760,7 +3760,15 @@
             <a:pPr lvl="1"/>
             <a:r>
               <a:rPr/>
-              <a:t>isValid(Path(ni, …, nk)) ⇔ ⋂j=i..k-1 Ie(nj,nj+1) ≠ ∅, Ie = [ta; tb[</a:t>
+              <a:t>isValid(Path(ni, …, nk))  ⇔  (</a:t>
+            </a:r>
+            <a:r>
+              <a:rPr i="1"/>
+              <a:t>{j=i}^{k-1} I</a:t>
+            </a:r>
+            <a:r>
+              <a:rPr/>
+              <a:t>{e(n_j, n_{j+1})} ), where (I_e = [t_a,, t_b[)</a:t>
             </a:r>
           </a:p>
           <a:p>
@@ -3921,14 +3929,21 @@
             <a:pPr lvl="1"/>
             <a:r>
               <a:rPr/>
-              <a:t>No support for cross time-series operations ;</a:t>
+              <a:t>No support for cross time-series operations;</a:t>
             </a:r>
           </a:p>
           <a:p>
             <a:pPr lvl="1"/>
             <a:r>
               <a:rPr/>
-              <a:t>Query to AsterixDB should be asynchronous ;</a:t>
+              <a:t>Query to AsterixDB should be asynchronous;</a:t>
+            </a:r>
+          </a:p>
+          <a:p>
+            <a:pPr lvl="1"/>
+            <a:r>
+              <a:rPr/>
+              <a:t>AsterixDB implementation could be far optimized and its full capabilities integrated;</a:t>
             </a:r>
           </a:p>
         </p:txBody>

</xml_diff>

<commit_message>
Deploying to gh-pages from @ ManuelePasini/slides-markdown@c541a3cce473b4ee2cf11a27133488d4d7bc57f6 🚀
</commit_message>
<xml_diff>
--- a/stgraph.pptx
+++ b/stgraph.pptx
@@ -3760,15 +3760,7 @@
             <a:pPr lvl="1"/>
             <a:r>
               <a:rPr/>
-              <a:t>isValid(Path(ni, …, nk))  ⇔  (</a:t>
-            </a:r>
-            <a:r>
-              <a:rPr i="1"/>
-              <a:t>{j=i}^{k-1} I</a:t>
-            </a:r>
-            <a:r>
-              <a:rPr/>
-              <a:t>{e(n_j, n_{j+1})} ), where (I_e = [t_a,, t_b[)</a:t>
+              <a:t>isValid(Path(ni, …, nk)) ⇔ ∩j=i..k-1 Ie(nj,nj+1) ≠ ∅, where Ie = [ta, tb[</a:t>
             </a:r>
           </a:p>
           <a:p>

</xml_diff>

<commit_message>
Deploying to gh-pages from @ ManuelePasini/slides-markdown@f86b25a2fa5f99877ab58499de1e3ac3cbcba880 🚀
</commit_message>
<xml_diff>
--- a/stgraph.pptx
+++ b/stgraph.pptx
@@ -3311,7 +3311,14 @@
             <a:pPr lvl="0"/>
             <a:r>
               <a:rPr/>
-              <a:t>Different layouts ➔ different ingestion and workload capabilities… -➔ Yet many modern data-intensive applications combine both, e.g., IoT systems, Digital Twins, and pervasive computing.</a:t>
+              <a:t>Different layouts ➔ different ingestion and workload capabilities…</a:t>
+            </a:r>
+          </a:p>
+          <a:p>
+            <a:pPr lvl="1"/>
+            <a:r>
+              <a:rPr/>
+              <a:t>Yet many modern data-intensive applications combine both, e.g., IoT systems, Digital Twins, and pervasive computing.</a:t>
             </a:r>
           </a:p>
           <a:p>
@@ -3830,7 +3837,7 @@
             <a:pPr lvl="2"/>
             <a:r>
               <a:rPr/>
-              <a:t>Naive nested-Loop join strategy;</a:t>
+              <a:t>Support for join operations through naive nested-Loop join;</a:t>
             </a:r>
           </a:p>
           <a:p>

</xml_diff>

<commit_message>
Deploying to gh-pages from @ ManuelePasini/slides-markdown@30efb756adf60e915f1448d694ded68d209a4686 🚀
</commit_message>
<xml_diff>
--- a/stgraph.pptx
+++ b/stgraph.pptx
@@ -3788,21 +3788,42 @@
             <a:pPr lvl="2"/>
             <a:r>
               <a:rPr/>
-              <a:t>Path exploration through temporal DFS;</a:t>
+              <a:t>Pattern matching:</a:t>
+            </a:r>
+          </a:p>
+          <a:p>
+            <a:pPr lvl="3"/>
+            <a:r>
+              <a:rPr/>
+              <a:t>Exploration through temporal DFS;</a:t>
+            </a:r>
+          </a:p>
+          <a:p>
+            <a:pPr lvl="3"/>
+            <a:r>
+              <a:rPr/>
+              <a:t>Materialization: if exploring a virtual edge, materialize its virtual nodes;</a:t>
+            </a:r>
+          </a:p>
+          <a:p>
+            <a:pPr lvl="3"/>
+            <a:r>
+              <a:rPr/>
+              <a:t>Filtering: apply constraints.</a:t>
             </a:r>
           </a:p>
           <a:p>
             <a:pPr lvl="2"/>
             <a:r>
               <a:rPr/>
-              <a:t>Path materialization: if exploring a virtual edge, materialize its virtual nodes;</a:t>
+              <a:t>Temporal properties replacement</a:t>
             </a:r>
           </a:p>
           <a:p>
             <a:pPr lvl="2"/>
             <a:r>
               <a:rPr/>
-              <a:t>Path filtering.</a:t>
+              <a:t>Aggregation/Join</a:t>
             </a:r>
           </a:p>
           <a:p>
@@ -3935,14 +3956,21 @@
             <a:pPr lvl="1"/>
             <a:r>
               <a:rPr/>
-              <a:t>Query to AsterixDB should be asynchronous;</a:t>
+              <a:t>Supporting only “long” values as TS measurements;</a:t>
             </a:r>
           </a:p>
           <a:p>
             <a:pPr lvl="1"/>
             <a:r>
               <a:rPr/>
-              <a:t>AsterixDB implementation could be far optimized and its full capabilities integrated;</a:t>
+              <a:t>Query to AsterixDB is synchronous (shouldn’t be);</a:t>
+            </a:r>
+          </a:p>
+          <a:p>
+            <a:pPr lvl="1"/>
+            <a:r>
+              <a:rPr/>
+              <a:t>Limited support for AsterixDB capabilities;</a:t>
             </a:r>
           </a:p>
         </p:txBody>

</xml_diff>

<commit_message>
Deploying to gh-pages from @ ManuelePasini/slides-markdown@5c06a026e538dad0abbb7c1e19217199b407e376 🚀
</commit_message>
<xml_diff>
--- a/stgraph.pptx
+++ b/stgraph.pptx
@@ -3781,49 +3781,49 @@
             <a:pPr lvl="1"/>
             <a:r>
               <a:rPr/>
-              <a:t>Executed in three iterative steps:</a:t>
+              <a:t>Executed in three steps:</a:t>
             </a:r>
           </a:p>
           <a:p>
             <a:pPr lvl="2"/>
             <a:r>
               <a:rPr/>
-              <a:t>Pattern matching:</a:t>
+              <a:t>Search:</a:t>
             </a:r>
           </a:p>
           <a:p>
             <a:pPr lvl="3"/>
             <a:r>
               <a:rPr/>
-              <a:t>Exploration through temporal DFS;</a:t>
+              <a:t>Path Exploration through temporal DFS;</a:t>
             </a:r>
           </a:p>
           <a:p>
             <a:pPr lvl="3"/>
             <a:r>
               <a:rPr/>
-              <a:t>Materialization: if exploring a virtual edge, materialize its virtual nodes;</a:t>
+              <a:t>Path Materialization: if exploring a virtual edge, materialize its virtual nodes;</a:t>
             </a:r>
           </a:p>
           <a:p>
             <a:pPr lvl="3"/>
             <a:r>
               <a:rPr/>
-              <a:t>Filtering: apply constraints.</a:t>
+              <a:t>Path Filtering: add path to solution if satisfies constraints.</a:t>
             </a:r>
           </a:p>
           <a:p>
             <a:pPr lvl="2"/>
             <a:r>
               <a:rPr/>
-              <a:t>Temporal properties replacement</a:t>
+              <a:t>Temporal properties replacement;</a:t>
             </a:r>
           </a:p>
           <a:p>
             <a:pPr lvl="2"/>
             <a:r>
               <a:rPr/>
-              <a:t>Aggregation/Join</a:t>
+              <a:t>Aggregate/Join.</a:t>
             </a:r>
           </a:p>
           <a:p>

</xml_diff>

<commit_message>
Deploying to gh-pages from @ ManuelePasini/slides-markdown@eca8b98929ba8160564bc3af2860493d4bbe29f2 🚀
</commit_message>
<xml_diff>
--- a/stgraph.pptx
+++ b/stgraph.pptx
@@ -3749,7 +3749,7 @@
             <a:spLocks noGrp="1"/>
           </p:cNvSpPr>
           <p:nvPr>
-            <p:ph idx="1"/>
+            <p:ph idx="1" sz="half"/>
           </p:nvPr>
         </p:nvSpPr>
         <p:spPr/>
@@ -3826,50 +3826,66 @@
               <a:t>Aggregate/Join.</a:t>
             </a:r>
           </a:p>
+        </p:txBody>
+      </p:sp>
+      <p:sp>
+        <p:nvSpPr>
+          <p:cNvPr id="4" name="Content Placeholder 3"/>
+          <p:cNvSpPr>
+            <a:spLocks noGrp="1"/>
+          </p:cNvSpPr>
+          <p:nvPr>
+            <p:ph idx="2" sz="half"/>
+          </p:nvPr>
+        </p:nvSpPr>
+        <p:spPr/>
+        <p:txBody>
+          <a:bodyPr/>
+          <a:lstStyle/>
+          <a:p>
+            <a:pPr lvl="0"/>
+            <a:r>
+              <a:rPr/>
+              <a:t>Materializing a virtual node:</a:t>
+            </a:r>
+          </a:p>
           <a:p>
             <a:pPr lvl="1"/>
             <a:r>
               <a:rPr/>
-              <a:t>Materializing a virtual node:</a:t>
-            </a:r>
-          </a:p>
-          <a:p>
-            <a:pPr lvl="2"/>
-            <a:r>
-              <a:rPr/>
               <a:t>Each virtual edge traversal entails a temporal query to AsterixDB;</a:t>
             </a:r>
           </a:p>
           <a:p>
-            <a:pPr lvl="2"/>
+            <a:pPr lvl="1"/>
             <a:r>
               <a:rPr/>
               <a:t>Output tuples are materialized as nodes (dummy ID) and connected within the graph.</a:t>
             </a:r>
           </a:p>
           <a:p>
+            <a:pPr lvl="0"/>
+            <a:r>
+              <a:rPr/>
+              <a:t>Optimizations</a:t>
+            </a:r>
+          </a:p>
+          <a:p>
             <a:pPr lvl="1"/>
             <a:r>
               <a:rPr/>
-              <a:t>Optimizations</a:t>
-            </a:r>
-          </a:p>
-          <a:p>
-            <a:pPr lvl="2"/>
-            <a:r>
-              <a:rPr/>
               <a:t>Support for join operations through naive nested-Loop join;</a:t>
             </a:r>
           </a:p>
           <a:p>
-            <a:pPr lvl="2"/>
+            <a:pPr lvl="1"/>
             <a:r>
               <a:rPr/>
               <a:t>Support for filter pushdown to AsterixDB;</a:t>
             </a:r>
           </a:p>
           <a:p>
-            <a:pPr lvl="2"/>
+            <a:pPr lvl="1"/>
             <a:r>
               <a:rPr/>
               <a:t>Support for spatial join/filtering operations (e.g., ST_INTERSECTS).</a:t>

</xml_diff>

<commit_message>
Deploying to gh-pages from @ ManuelePasini/slides-markdown@870220f700f4636344d7e0c5060b7651c43c3086 🚀
</commit_message>
<xml_diff>
--- a/stgraph.pptx
+++ b/stgraph.pptx
@@ -3895,6 +3895,382 @@
       </p:sp>
     </p:spTree>
   </p:cSld>
+  <p:timing>
+    <p:tnLst>
+      <p:par>
+        <p:cTn id="1" dur="indefinite" restart="never" nodeType="tmRoot">
+          <p:childTnLst>
+            <p:seq concurrent="1" nextAc="seek">
+              <p:cTn id="2" dur="indefinite" nodeType="mainSeq">
+                <p:childTnLst>
+                  <p:par>
+                    <p:cTn id="3" fill="hold">
+                      <p:stCondLst>
+                        <p:cond delay="indefinite"/>
+                      </p:stCondLst>
+                      <p:childTnLst>
+                        <p:par>
+                          <p:cTn id="4" fill="hold">
+                            <p:stCondLst>
+                              <p:cond delay="0"/>
+                            </p:stCondLst>
+                            <p:childTnLst>
+                              <p:par>
+                                <p:cTn id="5" presetID="1" presetClass="entr" presetSubtype="0" fill="hold" grpId="0" nodeType="clickEffect">
+                                  <p:stCondLst>
+                                    <p:cond delay="0"/>
+                                  </p:stCondLst>
+                                  <p:childTnLst>
+                                    <p:set>
+                                      <p:cBhvr>
+                                        <p:cTn id="6" dur="1" fill="hold">
+                                          <p:stCondLst>
+                                            <p:cond delay="0"/>
+                                          </p:stCondLst>
+                                        </p:cTn>
+                                        <p:tgtEl>
+                                          <p:spTgt spid="4">
+                                            <p:txEl>
+                                              <p:pRg st="0" end="0"/>
+                                            </p:txEl>
+                                          </p:spTgt>
+                                        </p:tgtEl>
+                                        <p:attrNameLst>
+                                          <p:attrName>style.visibility</p:attrName>
+                                        </p:attrNameLst>
+                                      </p:cBhvr>
+                                      <p:to>
+                                        <p:strVal val="visible"/>
+                                      </p:to>
+                                    </p:set>
+                                  </p:childTnLst>
+                                </p:cTn>
+                              </p:par>
+                            </p:childTnLst>
+                          </p:cTn>
+                        </p:par>
+                      </p:childTnLst>
+                    </p:cTn>
+                  </p:par>
+                  <p:par>
+                    <p:cTn id="7" fill="hold">
+                      <p:stCondLst>
+                        <p:cond delay="indefinite"/>
+                      </p:stCondLst>
+                      <p:childTnLst>
+                        <p:par>
+                          <p:cTn id="8" fill="hold">
+                            <p:stCondLst>
+                              <p:cond delay="0"/>
+                            </p:stCondLst>
+                            <p:childTnLst>
+                              <p:par>
+                                <p:cTn id="9" presetID="1" presetClass="entr" presetSubtype="0" fill="hold" grpId="0" nodeType="clickEffect">
+                                  <p:stCondLst>
+                                    <p:cond delay="0"/>
+                                  </p:stCondLst>
+                                  <p:childTnLst>
+                                    <p:set>
+                                      <p:cBhvr>
+                                        <p:cTn id="10" dur="1" fill="hold">
+                                          <p:stCondLst>
+                                            <p:cond delay="0"/>
+                                          </p:stCondLst>
+                                        </p:cTn>
+                                        <p:tgtEl>
+                                          <p:spTgt spid="4">
+                                            <p:txEl>
+                                              <p:pRg st="1" end="1"/>
+                                            </p:txEl>
+                                          </p:spTgt>
+                                        </p:tgtEl>
+                                        <p:attrNameLst>
+                                          <p:attrName>style.visibility</p:attrName>
+                                        </p:attrNameLst>
+                                      </p:cBhvr>
+                                      <p:to>
+                                        <p:strVal val="visible"/>
+                                      </p:to>
+                                    </p:set>
+                                  </p:childTnLst>
+                                </p:cTn>
+                              </p:par>
+                            </p:childTnLst>
+                          </p:cTn>
+                        </p:par>
+                      </p:childTnLst>
+                    </p:cTn>
+                  </p:par>
+                  <p:par>
+                    <p:cTn id="11" fill="hold">
+                      <p:stCondLst>
+                        <p:cond delay="indefinite"/>
+                      </p:stCondLst>
+                      <p:childTnLst>
+                        <p:par>
+                          <p:cTn id="12" fill="hold">
+                            <p:stCondLst>
+                              <p:cond delay="0"/>
+                            </p:stCondLst>
+                            <p:childTnLst>
+                              <p:par>
+                                <p:cTn id="13" presetID="1" presetClass="entr" presetSubtype="0" fill="hold" grpId="0" nodeType="clickEffect">
+                                  <p:stCondLst>
+                                    <p:cond delay="0"/>
+                                  </p:stCondLst>
+                                  <p:childTnLst>
+                                    <p:set>
+                                      <p:cBhvr>
+                                        <p:cTn id="14" dur="1" fill="hold">
+                                          <p:stCondLst>
+                                            <p:cond delay="0"/>
+                                          </p:stCondLst>
+                                        </p:cTn>
+                                        <p:tgtEl>
+                                          <p:spTgt spid="4">
+                                            <p:txEl>
+                                              <p:pRg st="2" end="2"/>
+                                            </p:txEl>
+                                          </p:spTgt>
+                                        </p:tgtEl>
+                                        <p:attrNameLst>
+                                          <p:attrName>style.visibility</p:attrName>
+                                        </p:attrNameLst>
+                                      </p:cBhvr>
+                                      <p:to>
+                                        <p:strVal val="visible"/>
+                                      </p:to>
+                                    </p:set>
+                                  </p:childTnLst>
+                                </p:cTn>
+                              </p:par>
+                            </p:childTnLst>
+                          </p:cTn>
+                        </p:par>
+                      </p:childTnLst>
+                    </p:cTn>
+                  </p:par>
+                  <p:par>
+                    <p:cTn id="15" fill="hold">
+                      <p:stCondLst>
+                        <p:cond delay="indefinite"/>
+                      </p:stCondLst>
+                      <p:childTnLst>
+                        <p:par>
+                          <p:cTn id="16" fill="hold">
+                            <p:stCondLst>
+                              <p:cond delay="0"/>
+                            </p:stCondLst>
+                            <p:childTnLst>
+                              <p:par>
+                                <p:cTn id="17" presetID="1" presetClass="entr" presetSubtype="0" fill="hold" grpId="0" nodeType="clickEffect">
+                                  <p:stCondLst>
+                                    <p:cond delay="0"/>
+                                  </p:stCondLst>
+                                  <p:childTnLst>
+                                    <p:set>
+                                      <p:cBhvr>
+                                        <p:cTn id="18" dur="1" fill="hold">
+                                          <p:stCondLst>
+                                            <p:cond delay="0"/>
+                                          </p:stCondLst>
+                                        </p:cTn>
+                                        <p:tgtEl>
+                                          <p:spTgt spid="4">
+                                            <p:txEl>
+                                              <p:pRg st="3" end="3"/>
+                                            </p:txEl>
+                                          </p:spTgt>
+                                        </p:tgtEl>
+                                        <p:attrNameLst>
+                                          <p:attrName>style.visibility</p:attrName>
+                                        </p:attrNameLst>
+                                      </p:cBhvr>
+                                      <p:to>
+                                        <p:strVal val="visible"/>
+                                      </p:to>
+                                    </p:set>
+                                  </p:childTnLst>
+                                </p:cTn>
+                              </p:par>
+                            </p:childTnLst>
+                          </p:cTn>
+                        </p:par>
+                      </p:childTnLst>
+                    </p:cTn>
+                  </p:par>
+                  <p:par>
+                    <p:cTn id="19" fill="hold">
+                      <p:stCondLst>
+                        <p:cond delay="indefinite"/>
+                      </p:stCondLst>
+                      <p:childTnLst>
+                        <p:par>
+                          <p:cTn id="20" fill="hold">
+                            <p:stCondLst>
+                              <p:cond delay="0"/>
+                            </p:stCondLst>
+                            <p:childTnLst>
+                              <p:par>
+                                <p:cTn id="21" presetID="1" presetClass="entr" presetSubtype="0" fill="hold" grpId="0" nodeType="clickEffect">
+                                  <p:stCondLst>
+                                    <p:cond delay="0"/>
+                                  </p:stCondLst>
+                                  <p:childTnLst>
+                                    <p:set>
+                                      <p:cBhvr>
+                                        <p:cTn id="22" dur="1" fill="hold">
+                                          <p:stCondLst>
+                                            <p:cond delay="0"/>
+                                          </p:stCondLst>
+                                        </p:cTn>
+                                        <p:tgtEl>
+                                          <p:spTgt spid="4">
+                                            <p:txEl>
+                                              <p:pRg st="4" end="4"/>
+                                            </p:txEl>
+                                          </p:spTgt>
+                                        </p:tgtEl>
+                                        <p:attrNameLst>
+                                          <p:attrName>style.visibility</p:attrName>
+                                        </p:attrNameLst>
+                                      </p:cBhvr>
+                                      <p:to>
+                                        <p:strVal val="visible"/>
+                                      </p:to>
+                                    </p:set>
+                                  </p:childTnLst>
+                                </p:cTn>
+                              </p:par>
+                            </p:childTnLst>
+                          </p:cTn>
+                        </p:par>
+                      </p:childTnLst>
+                    </p:cTn>
+                  </p:par>
+                  <p:par>
+                    <p:cTn id="23" fill="hold">
+                      <p:stCondLst>
+                        <p:cond delay="indefinite"/>
+                      </p:stCondLst>
+                      <p:childTnLst>
+                        <p:par>
+                          <p:cTn id="24" fill="hold">
+                            <p:stCondLst>
+                              <p:cond delay="0"/>
+                            </p:stCondLst>
+                            <p:childTnLst>
+                              <p:par>
+                                <p:cTn id="25" presetID="1" presetClass="entr" presetSubtype="0" fill="hold" grpId="0" nodeType="clickEffect">
+                                  <p:stCondLst>
+                                    <p:cond delay="0"/>
+                                  </p:stCondLst>
+                                  <p:childTnLst>
+                                    <p:set>
+                                      <p:cBhvr>
+                                        <p:cTn id="26" dur="1" fill="hold">
+                                          <p:stCondLst>
+                                            <p:cond delay="0"/>
+                                          </p:stCondLst>
+                                        </p:cTn>
+                                        <p:tgtEl>
+                                          <p:spTgt spid="4">
+                                            <p:txEl>
+                                              <p:pRg st="5" end="5"/>
+                                            </p:txEl>
+                                          </p:spTgt>
+                                        </p:tgtEl>
+                                        <p:attrNameLst>
+                                          <p:attrName>style.visibility</p:attrName>
+                                        </p:attrNameLst>
+                                      </p:cBhvr>
+                                      <p:to>
+                                        <p:strVal val="visible"/>
+                                      </p:to>
+                                    </p:set>
+                                  </p:childTnLst>
+                                </p:cTn>
+                              </p:par>
+                            </p:childTnLst>
+                          </p:cTn>
+                        </p:par>
+                      </p:childTnLst>
+                    </p:cTn>
+                  </p:par>
+                  <p:par>
+                    <p:cTn id="27" fill="hold">
+                      <p:stCondLst>
+                        <p:cond delay="indefinite"/>
+                      </p:stCondLst>
+                      <p:childTnLst>
+                        <p:par>
+                          <p:cTn id="28" fill="hold">
+                            <p:stCondLst>
+                              <p:cond delay="0"/>
+                            </p:stCondLst>
+                            <p:childTnLst>
+                              <p:par>
+                                <p:cTn id="29" presetID="1" presetClass="entr" presetSubtype="0" fill="hold" grpId="0" nodeType="clickEffect">
+                                  <p:stCondLst>
+                                    <p:cond delay="0"/>
+                                  </p:stCondLst>
+                                  <p:childTnLst>
+                                    <p:set>
+                                      <p:cBhvr>
+                                        <p:cTn id="30" dur="1" fill="hold">
+                                          <p:stCondLst>
+                                            <p:cond delay="0"/>
+                                          </p:stCondLst>
+                                        </p:cTn>
+                                        <p:tgtEl>
+                                          <p:spTgt spid="4">
+                                            <p:txEl>
+                                              <p:pRg st="6" end="6"/>
+                                            </p:txEl>
+                                          </p:spTgt>
+                                        </p:tgtEl>
+                                        <p:attrNameLst>
+                                          <p:attrName>style.visibility</p:attrName>
+                                        </p:attrNameLst>
+                                      </p:cBhvr>
+                                      <p:to>
+                                        <p:strVal val="visible"/>
+                                      </p:to>
+                                    </p:set>
+                                  </p:childTnLst>
+                                </p:cTn>
+                              </p:par>
+                            </p:childTnLst>
+                          </p:cTn>
+                        </p:par>
+                      </p:childTnLst>
+                    </p:cTn>
+                  </p:par>
+                </p:childTnLst>
+              </p:cTn>
+              <p:prevCondLst>
+                <p:cond evt="onPrev" delay="0">
+                  <p:tgtEl>
+                    <p:sldTgt/>
+                  </p:tgtEl>
+                </p:cond>
+              </p:prevCondLst>
+              <p:nextCondLst>
+                <p:cond evt="onNext" delay="0">
+                  <p:tgtEl>
+                    <p:sldTgt/>
+                  </p:tgtEl>
+                </p:cond>
+              </p:nextCondLst>
+            </p:seq>
+          </p:childTnLst>
+        </p:cTn>
+      </p:par>
+    </p:tnLst>
+    <p:bldLst>
+      <p:bldP spid="4" grpId="0" uiExpand="1" build="p"/>
+    </p:bldLst>
+  </p:timing>
 </p:sld>
 </file>
 

</xml_diff>

<commit_message>
Deploying to gh-pages from @ ManuelePasini/slides-markdown@e10879e96ae2588d141b7ac99ac675217e9a7a9b 🚀
</commit_message>
<xml_diff>
--- a/stgraph.pptx
+++ b/stgraph.pptx
@@ -3802,7 +3802,7 @@
             <a:pPr lvl="3"/>
             <a:r>
               <a:rPr/>
-              <a:t>Path Materialization: if exploring a virtual edge, materialize its virtual nodes;</a:t>
+              <a:t>Path instantiation: if exploring a virtual edge, instantiation its virtual nodes;</a:t>
             </a:r>
           </a:p>
           <a:p>
@@ -3895,382 +3895,6 @@
       </p:sp>
     </p:spTree>
   </p:cSld>
-  <p:timing>
-    <p:tnLst>
-      <p:par>
-        <p:cTn id="1" dur="indefinite" restart="never" nodeType="tmRoot">
-          <p:childTnLst>
-            <p:seq concurrent="1" nextAc="seek">
-              <p:cTn id="2" dur="indefinite" nodeType="mainSeq">
-                <p:childTnLst>
-                  <p:par>
-                    <p:cTn id="3" fill="hold">
-                      <p:stCondLst>
-                        <p:cond delay="indefinite"/>
-                      </p:stCondLst>
-                      <p:childTnLst>
-                        <p:par>
-                          <p:cTn id="4" fill="hold">
-                            <p:stCondLst>
-                              <p:cond delay="0"/>
-                            </p:stCondLst>
-                            <p:childTnLst>
-                              <p:par>
-                                <p:cTn id="5" presetID="1" presetClass="entr" presetSubtype="0" fill="hold" grpId="0" nodeType="clickEffect">
-                                  <p:stCondLst>
-                                    <p:cond delay="0"/>
-                                  </p:stCondLst>
-                                  <p:childTnLst>
-                                    <p:set>
-                                      <p:cBhvr>
-                                        <p:cTn id="6" dur="1" fill="hold">
-                                          <p:stCondLst>
-                                            <p:cond delay="0"/>
-                                          </p:stCondLst>
-                                        </p:cTn>
-                                        <p:tgtEl>
-                                          <p:spTgt spid="4">
-                                            <p:txEl>
-                                              <p:pRg st="0" end="0"/>
-                                            </p:txEl>
-                                          </p:spTgt>
-                                        </p:tgtEl>
-                                        <p:attrNameLst>
-                                          <p:attrName>style.visibility</p:attrName>
-                                        </p:attrNameLst>
-                                      </p:cBhvr>
-                                      <p:to>
-                                        <p:strVal val="visible"/>
-                                      </p:to>
-                                    </p:set>
-                                  </p:childTnLst>
-                                </p:cTn>
-                              </p:par>
-                            </p:childTnLst>
-                          </p:cTn>
-                        </p:par>
-                      </p:childTnLst>
-                    </p:cTn>
-                  </p:par>
-                  <p:par>
-                    <p:cTn id="7" fill="hold">
-                      <p:stCondLst>
-                        <p:cond delay="indefinite"/>
-                      </p:stCondLst>
-                      <p:childTnLst>
-                        <p:par>
-                          <p:cTn id="8" fill="hold">
-                            <p:stCondLst>
-                              <p:cond delay="0"/>
-                            </p:stCondLst>
-                            <p:childTnLst>
-                              <p:par>
-                                <p:cTn id="9" presetID="1" presetClass="entr" presetSubtype="0" fill="hold" grpId="0" nodeType="clickEffect">
-                                  <p:stCondLst>
-                                    <p:cond delay="0"/>
-                                  </p:stCondLst>
-                                  <p:childTnLst>
-                                    <p:set>
-                                      <p:cBhvr>
-                                        <p:cTn id="10" dur="1" fill="hold">
-                                          <p:stCondLst>
-                                            <p:cond delay="0"/>
-                                          </p:stCondLst>
-                                        </p:cTn>
-                                        <p:tgtEl>
-                                          <p:spTgt spid="4">
-                                            <p:txEl>
-                                              <p:pRg st="1" end="1"/>
-                                            </p:txEl>
-                                          </p:spTgt>
-                                        </p:tgtEl>
-                                        <p:attrNameLst>
-                                          <p:attrName>style.visibility</p:attrName>
-                                        </p:attrNameLst>
-                                      </p:cBhvr>
-                                      <p:to>
-                                        <p:strVal val="visible"/>
-                                      </p:to>
-                                    </p:set>
-                                  </p:childTnLst>
-                                </p:cTn>
-                              </p:par>
-                            </p:childTnLst>
-                          </p:cTn>
-                        </p:par>
-                      </p:childTnLst>
-                    </p:cTn>
-                  </p:par>
-                  <p:par>
-                    <p:cTn id="11" fill="hold">
-                      <p:stCondLst>
-                        <p:cond delay="indefinite"/>
-                      </p:stCondLst>
-                      <p:childTnLst>
-                        <p:par>
-                          <p:cTn id="12" fill="hold">
-                            <p:stCondLst>
-                              <p:cond delay="0"/>
-                            </p:stCondLst>
-                            <p:childTnLst>
-                              <p:par>
-                                <p:cTn id="13" presetID="1" presetClass="entr" presetSubtype="0" fill="hold" grpId="0" nodeType="clickEffect">
-                                  <p:stCondLst>
-                                    <p:cond delay="0"/>
-                                  </p:stCondLst>
-                                  <p:childTnLst>
-                                    <p:set>
-                                      <p:cBhvr>
-                                        <p:cTn id="14" dur="1" fill="hold">
-                                          <p:stCondLst>
-                                            <p:cond delay="0"/>
-                                          </p:stCondLst>
-                                        </p:cTn>
-                                        <p:tgtEl>
-                                          <p:spTgt spid="4">
-                                            <p:txEl>
-                                              <p:pRg st="2" end="2"/>
-                                            </p:txEl>
-                                          </p:spTgt>
-                                        </p:tgtEl>
-                                        <p:attrNameLst>
-                                          <p:attrName>style.visibility</p:attrName>
-                                        </p:attrNameLst>
-                                      </p:cBhvr>
-                                      <p:to>
-                                        <p:strVal val="visible"/>
-                                      </p:to>
-                                    </p:set>
-                                  </p:childTnLst>
-                                </p:cTn>
-                              </p:par>
-                            </p:childTnLst>
-                          </p:cTn>
-                        </p:par>
-                      </p:childTnLst>
-                    </p:cTn>
-                  </p:par>
-                  <p:par>
-                    <p:cTn id="15" fill="hold">
-                      <p:stCondLst>
-                        <p:cond delay="indefinite"/>
-                      </p:stCondLst>
-                      <p:childTnLst>
-                        <p:par>
-                          <p:cTn id="16" fill="hold">
-                            <p:stCondLst>
-                              <p:cond delay="0"/>
-                            </p:stCondLst>
-                            <p:childTnLst>
-                              <p:par>
-                                <p:cTn id="17" presetID="1" presetClass="entr" presetSubtype="0" fill="hold" grpId="0" nodeType="clickEffect">
-                                  <p:stCondLst>
-                                    <p:cond delay="0"/>
-                                  </p:stCondLst>
-                                  <p:childTnLst>
-                                    <p:set>
-                                      <p:cBhvr>
-                                        <p:cTn id="18" dur="1" fill="hold">
-                                          <p:stCondLst>
-                                            <p:cond delay="0"/>
-                                          </p:stCondLst>
-                                        </p:cTn>
-                                        <p:tgtEl>
-                                          <p:spTgt spid="4">
-                                            <p:txEl>
-                                              <p:pRg st="3" end="3"/>
-                                            </p:txEl>
-                                          </p:spTgt>
-                                        </p:tgtEl>
-                                        <p:attrNameLst>
-                                          <p:attrName>style.visibility</p:attrName>
-                                        </p:attrNameLst>
-                                      </p:cBhvr>
-                                      <p:to>
-                                        <p:strVal val="visible"/>
-                                      </p:to>
-                                    </p:set>
-                                  </p:childTnLst>
-                                </p:cTn>
-                              </p:par>
-                            </p:childTnLst>
-                          </p:cTn>
-                        </p:par>
-                      </p:childTnLst>
-                    </p:cTn>
-                  </p:par>
-                  <p:par>
-                    <p:cTn id="19" fill="hold">
-                      <p:stCondLst>
-                        <p:cond delay="indefinite"/>
-                      </p:stCondLst>
-                      <p:childTnLst>
-                        <p:par>
-                          <p:cTn id="20" fill="hold">
-                            <p:stCondLst>
-                              <p:cond delay="0"/>
-                            </p:stCondLst>
-                            <p:childTnLst>
-                              <p:par>
-                                <p:cTn id="21" presetID="1" presetClass="entr" presetSubtype="0" fill="hold" grpId="0" nodeType="clickEffect">
-                                  <p:stCondLst>
-                                    <p:cond delay="0"/>
-                                  </p:stCondLst>
-                                  <p:childTnLst>
-                                    <p:set>
-                                      <p:cBhvr>
-                                        <p:cTn id="22" dur="1" fill="hold">
-                                          <p:stCondLst>
-                                            <p:cond delay="0"/>
-                                          </p:stCondLst>
-                                        </p:cTn>
-                                        <p:tgtEl>
-                                          <p:spTgt spid="4">
-                                            <p:txEl>
-                                              <p:pRg st="4" end="4"/>
-                                            </p:txEl>
-                                          </p:spTgt>
-                                        </p:tgtEl>
-                                        <p:attrNameLst>
-                                          <p:attrName>style.visibility</p:attrName>
-                                        </p:attrNameLst>
-                                      </p:cBhvr>
-                                      <p:to>
-                                        <p:strVal val="visible"/>
-                                      </p:to>
-                                    </p:set>
-                                  </p:childTnLst>
-                                </p:cTn>
-                              </p:par>
-                            </p:childTnLst>
-                          </p:cTn>
-                        </p:par>
-                      </p:childTnLst>
-                    </p:cTn>
-                  </p:par>
-                  <p:par>
-                    <p:cTn id="23" fill="hold">
-                      <p:stCondLst>
-                        <p:cond delay="indefinite"/>
-                      </p:stCondLst>
-                      <p:childTnLst>
-                        <p:par>
-                          <p:cTn id="24" fill="hold">
-                            <p:stCondLst>
-                              <p:cond delay="0"/>
-                            </p:stCondLst>
-                            <p:childTnLst>
-                              <p:par>
-                                <p:cTn id="25" presetID="1" presetClass="entr" presetSubtype="0" fill="hold" grpId="0" nodeType="clickEffect">
-                                  <p:stCondLst>
-                                    <p:cond delay="0"/>
-                                  </p:stCondLst>
-                                  <p:childTnLst>
-                                    <p:set>
-                                      <p:cBhvr>
-                                        <p:cTn id="26" dur="1" fill="hold">
-                                          <p:stCondLst>
-                                            <p:cond delay="0"/>
-                                          </p:stCondLst>
-                                        </p:cTn>
-                                        <p:tgtEl>
-                                          <p:spTgt spid="4">
-                                            <p:txEl>
-                                              <p:pRg st="5" end="5"/>
-                                            </p:txEl>
-                                          </p:spTgt>
-                                        </p:tgtEl>
-                                        <p:attrNameLst>
-                                          <p:attrName>style.visibility</p:attrName>
-                                        </p:attrNameLst>
-                                      </p:cBhvr>
-                                      <p:to>
-                                        <p:strVal val="visible"/>
-                                      </p:to>
-                                    </p:set>
-                                  </p:childTnLst>
-                                </p:cTn>
-                              </p:par>
-                            </p:childTnLst>
-                          </p:cTn>
-                        </p:par>
-                      </p:childTnLst>
-                    </p:cTn>
-                  </p:par>
-                  <p:par>
-                    <p:cTn id="27" fill="hold">
-                      <p:stCondLst>
-                        <p:cond delay="indefinite"/>
-                      </p:stCondLst>
-                      <p:childTnLst>
-                        <p:par>
-                          <p:cTn id="28" fill="hold">
-                            <p:stCondLst>
-                              <p:cond delay="0"/>
-                            </p:stCondLst>
-                            <p:childTnLst>
-                              <p:par>
-                                <p:cTn id="29" presetID="1" presetClass="entr" presetSubtype="0" fill="hold" grpId="0" nodeType="clickEffect">
-                                  <p:stCondLst>
-                                    <p:cond delay="0"/>
-                                  </p:stCondLst>
-                                  <p:childTnLst>
-                                    <p:set>
-                                      <p:cBhvr>
-                                        <p:cTn id="30" dur="1" fill="hold">
-                                          <p:stCondLst>
-                                            <p:cond delay="0"/>
-                                          </p:stCondLst>
-                                        </p:cTn>
-                                        <p:tgtEl>
-                                          <p:spTgt spid="4">
-                                            <p:txEl>
-                                              <p:pRg st="6" end="6"/>
-                                            </p:txEl>
-                                          </p:spTgt>
-                                        </p:tgtEl>
-                                        <p:attrNameLst>
-                                          <p:attrName>style.visibility</p:attrName>
-                                        </p:attrNameLst>
-                                      </p:cBhvr>
-                                      <p:to>
-                                        <p:strVal val="visible"/>
-                                      </p:to>
-                                    </p:set>
-                                  </p:childTnLst>
-                                </p:cTn>
-                              </p:par>
-                            </p:childTnLst>
-                          </p:cTn>
-                        </p:par>
-                      </p:childTnLst>
-                    </p:cTn>
-                  </p:par>
-                </p:childTnLst>
-              </p:cTn>
-              <p:prevCondLst>
-                <p:cond evt="onPrev" delay="0">
-                  <p:tgtEl>
-                    <p:sldTgt/>
-                  </p:tgtEl>
-                </p:cond>
-              </p:prevCondLst>
-              <p:nextCondLst>
-                <p:cond evt="onNext" delay="0">
-                  <p:tgtEl>
-                    <p:sldTgt/>
-                  </p:tgtEl>
-                </p:cond>
-              </p:nextCondLst>
-            </p:seq>
-          </p:childTnLst>
-        </p:cTn>
-      </p:par>
-    </p:tnLst>
-    <p:bldLst>
-      <p:bldP spid="4" grpId="0" uiExpand="1" build="p"/>
-    </p:bldLst>
-  </p:timing>
 </p:sld>
 </file>
 

</xml_diff>

<commit_message>
Deploying to gh-pages from @ ManuelePasini/slides-markdown@f5ac7a071a97079a086461f1011338d1d4d0b158 🚀
</commit_message>
<xml_diff>
--- a/stgraph.pptx
+++ b/stgraph.pptx
@@ -12,6 +12,7 @@
     <p:sldId id="260" r:id="rId6"/>
     <p:sldId id="261" r:id="rId7"/>
     <p:sldId id="262" r:id="rId8"/>
+    <p:sldId id="263" r:id="rId9"/>
   </p:sldIdLst>
   <p:sldSz cx="9144000" cy="5143500" type="screen16x9"/>
   <p:notesSz cx="6858000" cy="9144000"/>
@@ -3987,6 +3988,132 @@
             <a:r>
               <a:rPr/>
               <a:t>Limited support for AsterixDB capabilities;</a:t>
+            </a:r>
+          </a:p>
+        </p:txBody>
+      </p:sp>
+    </p:spTree>
+  </p:cSld>
+</p:sld>
+</file>
+
+<file path=ppt/slides/slide8.xml><?xml version="1.0" encoding="utf-8"?>
+<p:sld xmlns:a="http://schemas.openxmlformats.org/drawingml/2006/main" xmlns:r="http://schemas.openxmlformats.org/officeDocument/2006/relationships" xmlns:p="http://schemas.openxmlformats.org/presentationml/2006/main">
+  <p:cSld>
+    <p:spTree>
+      <p:nvGrpSpPr>
+        <p:cNvPr id="1" name=""/>
+        <p:cNvGrpSpPr/>
+        <p:nvPr/>
+      </p:nvGrpSpPr>
+      <p:grpSpPr>
+        <a:xfrm>
+          <a:off x="0" y="0"/>
+          <a:ext cx="0" cy="0"/>
+          <a:chOff x="0" y="0"/>
+          <a:chExt cx="0" cy="0"/>
+        </a:xfrm>
+      </p:grpSpPr>
+      <p:sp>
+        <p:nvSpPr>
+          <p:cNvPr id="2" name="Title 1"/>
+          <p:cNvSpPr>
+            <a:spLocks noGrp="1"/>
+          </p:cNvSpPr>
+          <p:nvPr>
+            <p:ph type="title"/>
+          </p:nvPr>
+        </p:nvSpPr>
+        <p:spPr/>
+        <p:txBody>
+          <a:bodyPr/>
+          <a:lstStyle/>
+          <a:p>
+            <a:pPr lvl="0" indent="0" marL="0">
+              <a:buNone/>
+            </a:pPr>
+            <a:r>
+              <a:rPr/>
+              <a:t>Collaborations</a:t>
+            </a:r>
+          </a:p>
+        </p:txBody>
+      </p:sp>
+      <p:sp>
+        <p:nvSpPr>
+          <p:cNvPr id="3" name="Content Placeholder 2"/>
+          <p:cNvSpPr>
+            <a:spLocks noGrp="1"/>
+          </p:cNvSpPr>
+          <p:nvPr>
+            <p:ph idx="1"/>
+          </p:nvPr>
+        </p:nvSpPr>
+        <p:spPr/>
+        <p:txBody>
+          <a:bodyPr/>
+          <a:lstStyle/>
+          <a:p>
+            <a:pPr lvl="0"/>
+            <a:r>
+              <a:rPr/>
+              <a:t>Physical level:</a:t>
+            </a:r>
+          </a:p>
+          <a:p>
+            <a:pPr lvl="1"/>
+            <a:r>
+              <a:rPr/>
+              <a:t>TS data require different data layout than graph data;</a:t>
+            </a:r>
+          </a:p>
+          <a:p>
+            <a:pPr lvl="2"/>
+            <a:r>
+              <a:rPr/>
+              <a:t>LSM-Tree-like (RocksDB)</a:t>
+            </a:r>
+          </a:p>
+          <a:p>
+            <a:pPr lvl="2"/>
+            <a:r>
+              <a:rPr/>
+              <a:t>InfluxDB 3.0 on Parquet.</a:t>
+            </a:r>
+          </a:p>
+          <a:p>
+            <a:pPr lvl="1"/>
+            <a:r>
+              <a:rPr/>
+              <a:t>Metadata modelling;</a:t>
+            </a:r>
+          </a:p>
+          <a:p>
+            <a:pPr lvl="1"/>
+            <a:r>
+              <a:rPr/>
+              <a:t>algorithms optimizations;</a:t>
+            </a:r>
+          </a:p>
+          <a:p>
+            <a:pPr lvl="0"/>
+            <a:r>
+              <a:rPr/>
+              <a:t>Analytics:</a:t>
+            </a:r>
+          </a:p>
+          <a:p>
+            <a:pPr lvl="1"/>
+            <a:r>
+              <a:rPr/>
+              <a:t>TS operations in graph QL (Graph analytics);</a:t>
+            </a:r>
+          </a:p>
+          <a:p>
+            <a:pPr lvl="1"/>
+            <a:r>
+              <a:rPr/>
+              <a:t>Cross time-series operations;</a:t>
             </a:r>
           </a:p>
         </p:txBody>

</xml_diff>

<commit_message>
Deploying to gh-pages from @ ManuelePasini/slides-markdown@6a41e294cb7361706bf0ef44d0c8c1105d0bfd9e 🚀
</commit_message>
<xml_diff>
--- a/stgraph.pptx
+++ b/stgraph.pptx
@@ -4071,7 +4071,7 @@
             <a:pPr lvl="2"/>
             <a:r>
               <a:rPr/>
-              <a:t>LSM-Tree-like (RocksDB)</a:t>
+              <a:t>LSM-Tree-like (e.g., RocksDB)</a:t>
             </a:r>
           </a:p>
           <a:p>
@@ -4085,14 +4085,14 @@
             <a:pPr lvl="1"/>
             <a:r>
               <a:rPr/>
-              <a:t>Metadata modelling;</a:t>
+              <a:t>Metadata modelling (custom metadata as a query);</a:t>
             </a:r>
           </a:p>
           <a:p>
             <a:pPr lvl="1"/>
             <a:r>
               <a:rPr/>
-              <a:t>algorithms optimizations;</a:t>
+              <a:t>query formalization and optimization;</a:t>
             </a:r>
           </a:p>
           <a:p>
@@ -4106,14 +4106,77 @@
             <a:pPr lvl="1"/>
             <a:r>
               <a:rPr/>
-              <a:t>TS operations in graph QL (Graph analytics);</a:t>
+              <a:t>TS operators in Cypher/GQL (Graph analytics);</a:t>
+            </a:r>
+          </a:p>
+          <a:p>
+            <a:pPr lvl="2"/>
+            <a:r>
+              <a:rPr/>
+              <a:t>shape-matching;</a:t>
             </a:r>
           </a:p>
           <a:p>
             <a:pPr lvl="1"/>
             <a:r>
               <a:rPr/>
-              <a:t>Cross time-series operations;</a:t>
+              <a:t>Cross time-series operators:</a:t>
+            </a:r>
+          </a:p>
+          <a:p>
+            <a:pPr lvl="2"/>
+            <a:r>
+              <a:rPr/>
+              <a:t>Dimmi piante/griglie che hanno avuto pattern asciugatura simili ultime 24h.</a:t>
+            </a:r>
+          </a:p>
+          <a:p>
+            <a:pPr lvl="2"/>
+            <a:r>
+              <a:rPr/>
+              <a:t>Correlami con join spaziale asciugatura terreno piante e temperatura da centralina ARPAE.</a:t>
+            </a:r>
+          </a:p>
+          <a:p>
+            <a:pPr lvl="1"/>
+            <a:r>
+              <a:rPr/>
+              <a:t>Graph-TS cross-operators:</a:t>
+            </a:r>
+          </a:p>
+          <a:p>
+            <a:pPr lvl="2"/>
+            <a:r>
+              <a:rPr/>
+              <a:t>Come si è evoluta topologia grafo all’evolversi della ts?</a:t>
+            </a:r>
+          </a:p>
+          <a:p>
+            <a:pPr lvl="2"/>
+            <a:r>
+              <a:rPr/>
+              <a:t>Correlare grado (o property) di un nodo e andamento di una TS (picco di connessione, picco di valore)</a:t>
+            </a:r>
+          </a:p>
+          <a:p>
+            <a:pPr lvl="3"/>
+            <a:r>
+              <a:rPr/>
+              <a:t>e.g., rete di sensori monitora punti pressione frana, archi tra sensori modellato con hygraph con una property che aumenta il peso dell’arco tra due sensori vicini all’aumentare della pressione di uno dei due. cerca correlazione tra punti di pressione diversi nella frana.</a:t>
+            </a:r>
+          </a:p>
+          <a:p>
+            <a:pPr lvl="0"/>
+            <a:r>
+              <a:rPr/>
+              <a:t>LLMs:</a:t>
+            </a:r>
+          </a:p>
+          <a:p>
+            <a:pPr lvl="1"/>
+            <a:r>
+              <a:rPr/>
+              <a:t>Text to query (in hybrid data models)</a:t>
             </a:r>
           </a:p>
         </p:txBody>

</xml_diff>

<commit_message>
Deploying to gh-pages from @ ManuelePasini/slides-markdown@ef481cbd7f617380f1948a939eed6f4954e99e03 🚀
</commit_message>
<xml_diff>
--- a/stgraph.pptx
+++ b/stgraph.pptx
@@ -4085,7 +4085,7 @@
             <a:pPr lvl="1"/>
             <a:r>
               <a:rPr/>
-              <a:t>Metadata modelling (custom metadata as a query);</a:t>
+              <a:t>Metadata modelling (ausiliary structures);</a:t>
             </a:r>
           </a:p>
           <a:p>
@@ -4113,7 +4113,7 @@
             <a:pPr lvl="2"/>
             <a:r>
               <a:rPr/>
-              <a:t>shape-matching;</a:t>
+              <a:t>shape/patthern matching;</a:t>
             </a:r>
           </a:p>
           <a:p>
@@ -4127,56 +4127,56 @@
             <a:pPr lvl="2"/>
             <a:r>
               <a:rPr/>
-              <a:t>Dimmi piante/griglie che hanno avuto pattern asciugatura simili ultime 24h.</a:t>
+              <a:t>Identify plants/grids with similar drying patterns over the last 24h</a:t>
+            </a:r>
+          </a:p>
+          <a:p>
+            <a:pPr lvl="1"/>
+            <a:r>
+              <a:rPr/>
+              <a:t>Graph-TS cross-operators:</a:t>
             </a:r>
           </a:p>
           <a:p>
             <a:pPr lvl="2"/>
             <a:r>
               <a:rPr/>
-              <a:t>Correlami con join spaziale asciugatura terreno piante e temperatura da centralina ARPAE.</a:t>
+              <a:t>Correlate graph metrics (node degree, node/edge properties) with time-series trends</a:t>
+            </a:r>
+          </a:p>
+          <a:p>
+            <a:pPr lvl="3"/>
+            <a:r>
+              <a:rPr/>
+              <a:t>e.g., landslide monitoring sensor network: correlation between pressure measurements and dynamic edge weights between nearby sensors</a:t>
+            </a:r>
+          </a:p>
+          <a:p>
+            <a:pPr lvl="2"/>
+            <a:r>
+              <a:rPr/>
+              <a:t>Correlate soil drying with temperature (spatial join with ARPAE weather stations)</a:t>
+            </a:r>
+          </a:p>
+          <a:p>
+            <a:pPr lvl="0"/>
+            <a:r>
+              <a:rPr/>
+              <a:t>LLMs:</a:t>
             </a:r>
           </a:p>
           <a:p>
             <a:pPr lvl="1"/>
             <a:r>
               <a:rPr/>
-              <a:t>Graph-TS cross-operators:</a:t>
-            </a:r>
-          </a:p>
-          <a:p>
-            <a:pPr lvl="2"/>
-            <a:r>
-              <a:rPr/>
-              <a:t>Come si è evoluta topologia grafo all’evolversi della ts?</a:t>
-            </a:r>
-          </a:p>
-          <a:p>
-            <a:pPr lvl="2"/>
-            <a:r>
-              <a:rPr/>
-              <a:t>Correlare grado (o property) di un nodo e andamento di una TS (picco di connessione, picco di valore)</a:t>
-            </a:r>
-          </a:p>
-          <a:p>
-            <a:pPr lvl="3"/>
-            <a:r>
-              <a:rPr/>
-              <a:t>e.g., rete di sensori monitora punti pressione frana, archi tra sensori modellato con hygraph con una property che aumenta il peso dell’arco tra due sensori vicini all’aumentare della pressione di uno dei due. cerca correlazione tra punti di pressione diversi nella frana.</a:t>
-            </a:r>
-          </a:p>
-          <a:p>
-            <a:pPr lvl="0"/>
-            <a:r>
-              <a:rPr/>
-              <a:t>LLMs:</a:t>
+              <a:t>Text to query (in hybrid models)</a:t>
             </a:r>
           </a:p>
           <a:p>
             <a:pPr lvl="1"/>
             <a:r>
               <a:rPr/>
-              <a:t>Text to query (in hybrid data models)</a:t>
+              <a:t>Repair</a:t>
             </a:r>
           </a:p>
         </p:txBody>

</xml_diff>

<commit_message>
Deploying to gh-pages from @ ManuelePasini/slides-markdown@bb96051ac723a39fc08f88b78f9b69848acc6a53 🚀
</commit_message>
<xml_diff>
--- a/stgraph.pptx
+++ b/stgraph.pptx
@@ -4141,14 +4141,14 @@
             <a:pPr lvl="2"/>
             <a:r>
               <a:rPr/>
-              <a:t>Correlate graph metrics (node degree, node/edge properties) with time-series trends</a:t>
+              <a:t>Correlate graph metrics with time-series trends</a:t>
             </a:r>
           </a:p>
           <a:p>
             <a:pPr lvl="3"/>
             <a:r>
               <a:rPr/>
-              <a:t>e.g., landslide monitoring sensor network: correlation between pressure measurements and dynamic edge weights between nearby sensors</a:t>
+              <a:t>e.g., landslide monitoring sensor network: correlation between pressure measurements and node degree between nearby sensors</a:t>
             </a:r>
           </a:p>
           <a:p>
@@ -4162,21 +4162,14 @@
             <a:pPr lvl="0"/>
             <a:r>
               <a:rPr/>
-              <a:t>LLMs:</a:t>
+              <a:t>Multistore:</a:t>
             </a:r>
           </a:p>
           <a:p>
             <a:pPr lvl="1"/>
             <a:r>
               <a:rPr/>
-              <a:t>Text to query (in hybrid models)</a:t>
-            </a:r>
-          </a:p>
-          <a:p>
-            <a:pPr lvl="1"/>
-            <a:r>
-              <a:rPr/>
-              <a:t>Repair</a:t>
+              <a:t>Provide a unified language that transparently distributes the execution plan on different engines</a:t>
             </a:r>
           </a:p>
         </p:txBody>

</xml_diff>

<commit_message>
Deploying to gh-pages from @ ManuelePasini/slides-markdown@5c9bba3bb5c5c100bb3e6a6d52480610925cf9eb 🚀
</commit_message>
<xml_diff>
--- a/stgraph.pptx
+++ b/stgraph.pptx
@@ -4120,7 +4120,7 @@
             <a:pPr lvl="1"/>
             <a:r>
               <a:rPr/>
-              <a:t>Cross time-series operators:</a:t>
+              <a:t>Graph-TS cross-operators:</a:t>
             </a:r>
           </a:p>
           <a:p>
@@ -4131,45 +4131,38 @@
             </a:r>
           </a:p>
           <a:p>
+            <a:pPr lvl="2"/>
+            <a:r>
+              <a:rPr/>
+              <a:t>Correlate graph metrics with time-series trends</a:t>
+            </a:r>
+          </a:p>
+          <a:p>
+            <a:pPr lvl="3"/>
+            <a:r>
+              <a:rPr/>
+              <a:t>e.g., landslide monitoring sensor network: correlation between pressure measurements and node degree between nearby sensors</a:t>
+            </a:r>
+          </a:p>
+          <a:p>
+            <a:pPr lvl="2"/>
+            <a:r>
+              <a:rPr/>
+              <a:t>Correlate soil drying with temperature (spatial join with ARPAE weather stations)</a:t>
+            </a:r>
+          </a:p>
+          <a:p>
+            <a:pPr lvl="0"/>
+            <a:r>
+              <a:rPr/>
+              <a:t>Multistore:</a:t>
+            </a:r>
+          </a:p>
+          <a:p>
             <a:pPr lvl="1"/>
             <a:r>
               <a:rPr/>
-              <a:t>Graph-TS cross-operators:</a:t>
-            </a:r>
-          </a:p>
-          <a:p>
-            <a:pPr lvl="2"/>
-            <a:r>
-              <a:rPr/>
-              <a:t>Correlate graph metrics with time-series trends</a:t>
-            </a:r>
-          </a:p>
-          <a:p>
-            <a:pPr lvl="3"/>
-            <a:r>
-              <a:rPr/>
-              <a:t>e.g., landslide monitoring sensor network: correlation between pressure measurements and node degree between nearby sensors</a:t>
-            </a:r>
-          </a:p>
-          <a:p>
-            <a:pPr lvl="2"/>
-            <a:r>
-              <a:rPr/>
-              <a:t>Correlate soil drying with temperature (spatial join with ARPAE weather stations)</a:t>
-            </a:r>
-          </a:p>
-          <a:p>
-            <a:pPr lvl="0"/>
-            <a:r>
-              <a:rPr/>
-              <a:t>Multistore:</a:t>
-            </a:r>
-          </a:p>
-          <a:p>
-            <a:pPr lvl="1"/>
-            <a:r>
-              <a:rPr/>
-              <a:t>Provide a unified language that transparently distributes the execution plan on different engines</a:t>
+              <a:t>Provide a unified language that transparently distributes the execution plan on different engines.</a:t>
             </a:r>
           </a:p>
         </p:txBody>

</xml_diff>